<commit_message>
Updated presentation, added flow diagrams
</commit_message>
<xml_diff>
--- a/Project/Presentation.pptx
+++ b/Project/Presentation.pptx
@@ -8,16 +8,18 @@
     <p:sldId id="256" r:id="rId2"/>
     <p:sldId id="257" r:id="rId3"/>
     <p:sldId id="258" r:id="rId4"/>
-    <p:sldId id="261" r:id="rId5"/>
-    <p:sldId id="259" r:id="rId6"/>
-    <p:sldId id="260" r:id="rId7"/>
-    <p:sldId id="263" r:id="rId8"/>
-    <p:sldId id="262" r:id="rId9"/>
-    <p:sldId id="268" r:id="rId10"/>
-    <p:sldId id="267" r:id="rId11"/>
-    <p:sldId id="266" r:id="rId12"/>
-    <p:sldId id="265" r:id="rId13"/>
-    <p:sldId id="264" r:id="rId14"/>
+    <p:sldId id="263" r:id="rId5"/>
+    <p:sldId id="262" r:id="rId6"/>
+    <p:sldId id="270" r:id="rId7"/>
+    <p:sldId id="268" r:id="rId8"/>
+    <p:sldId id="267" r:id="rId9"/>
+    <p:sldId id="266" r:id="rId10"/>
+    <p:sldId id="265" r:id="rId11"/>
+    <p:sldId id="269" r:id="rId12"/>
+    <p:sldId id="264" r:id="rId13"/>
+    <p:sldId id="261" r:id="rId14"/>
+    <p:sldId id="259" r:id="rId15"/>
+    <p:sldId id="260" r:id="rId16"/>
   </p:sldIdLst>
   <p:sldSz cx="12192000" cy="6858000"/>
   <p:notesSz cx="6858000" cy="9144000"/>
@@ -116,6 +118,11 @@
       </a:defRPr>
     </a:lvl9pPr>
   </p:defaultTextStyle>
+  <p:extLst>
+    <p:ext uri="{EFAFB233-063F-42B5-8137-9DF3F51BA10A}">
+      <p15:sldGuideLst xmlns:p15="http://schemas.microsoft.com/office/powerpoint/2012/main"/>
+    </p:ext>
+  </p:extLst>
 </p:presentation>
 </file>
 
@@ -841,7 +848,7 @@
           <a:p>
             <a:fld id="{D8DCDA63-C378-4D8D-91ED-C6497C5896B9}" type="datetimeFigureOut">
               <a:rPr lang="en-US" smtClean="0"/>
-              <a:t>3/11/2020</a:t>
+              <a:t>3/12/20</a:t>
             </a:fld>
             <a:endParaRPr lang="en-US"/>
           </a:p>
@@ -1092,7 +1099,7 @@
           <a:p>
             <a:fld id="{D8DCDA63-C378-4D8D-91ED-C6497C5896B9}" type="datetimeFigureOut">
               <a:rPr lang="en-US" smtClean="0"/>
-              <a:t>3/11/2020</a:t>
+              <a:t>3/12/20</a:t>
             </a:fld>
             <a:endParaRPr lang="en-US"/>
           </a:p>
@@ -1406,7 +1413,7 @@
           <a:p>
             <a:fld id="{D8DCDA63-C378-4D8D-91ED-C6497C5896B9}" type="datetimeFigureOut">
               <a:rPr lang="en-US" smtClean="0"/>
-              <a:t>3/11/2020</a:t>
+              <a:t>3/12/20</a:t>
             </a:fld>
             <a:endParaRPr lang="en-US"/>
           </a:p>
@@ -1747,7 +1754,7 @@
           <a:p>
             <a:fld id="{D8DCDA63-C378-4D8D-91ED-C6497C5896B9}" type="datetimeFigureOut">
               <a:rPr lang="en-US" smtClean="0"/>
-              <a:t>3/11/2020</a:t>
+              <a:t>3/12/20</a:t>
             </a:fld>
             <a:endParaRPr lang="en-US"/>
           </a:p>
@@ -2061,7 +2068,7 @@
           <a:p>
             <a:fld id="{D8DCDA63-C378-4D8D-91ED-C6497C5896B9}" type="datetimeFigureOut">
               <a:rPr lang="en-US" smtClean="0"/>
-              <a:t>3/11/2020</a:t>
+              <a:t>3/12/20</a:t>
             </a:fld>
             <a:endParaRPr lang="en-US"/>
           </a:p>
@@ -2454,7 +2461,7 @@
           <a:p>
             <a:fld id="{D8DCDA63-C378-4D8D-91ED-C6497C5896B9}" type="datetimeFigureOut">
               <a:rPr lang="en-US" smtClean="0"/>
-              <a:t>3/11/2020</a:t>
+              <a:t>3/12/20</a:t>
             </a:fld>
             <a:endParaRPr lang="en-US"/>
           </a:p>
@@ -2624,7 +2631,7 @@
           <a:p>
             <a:fld id="{D8DCDA63-C378-4D8D-91ED-C6497C5896B9}" type="datetimeFigureOut">
               <a:rPr lang="en-US" smtClean="0"/>
-              <a:t>3/11/2020</a:t>
+              <a:t>3/12/20</a:t>
             </a:fld>
             <a:endParaRPr lang="en-US"/>
           </a:p>
@@ -2804,7 +2811,7 @@
           <a:p>
             <a:fld id="{D8DCDA63-C378-4D8D-91ED-C6497C5896B9}" type="datetimeFigureOut">
               <a:rPr lang="en-US" smtClean="0"/>
-              <a:t>3/11/2020</a:t>
+              <a:t>3/12/20</a:t>
             </a:fld>
             <a:endParaRPr lang="en-US"/>
           </a:p>
@@ -2980,7 +2987,7 @@
           <a:p>
             <a:fld id="{D8DCDA63-C378-4D8D-91ED-C6497C5896B9}" type="datetimeFigureOut">
               <a:rPr lang="en-US" smtClean="0"/>
-              <a:t>3/11/2020</a:t>
+              <a:t>3/12/20</a:t>
             </a:fld>
             <a:endParaRPr lang="en-US"/>
           </a:p>
@@ -3227,7 +3234,7 @@
           <a:p>
             <a:fld id="{D8DCDA63-C378-4D8D-91ED-C6497C5896B9}" type="datetimeFigureOut">
               <a:rPr lang="en-US" smtClean="0"/>
-              <a:t>3/11/2020</a:t>
+              <a:t>3/12/20</a:t>
             </a:fld>
             <a:endParaRPr lang="en-US"/>
           </a:p>
@@ -3459,7 +3466,7 @@
           <a:p>
             <a:fld id="{D8DCDA63-C378-4D8D-91ED-C6497C5896B9}" type="datetimeFigureOut">
               <a:rPr lang="en-US" smtClean="0"/>
-              <a:t>3/11/2020</a:t>
+              <a:t>3/12/20</a:t>
             </a:fld>
             <a:endParaRPr lang="en-US"/>
           </a:p>
@@ -3833,7 +3840,7 @@
           <a:p>
             <a:fld id="{D8DCDA63-C378-4D8D-91ED-C6497C5896B9}" type="datetimeFigureOut">
               <a:rPr lang="en-US" smtClean="0"/>
-              <a:t>3/11/2020</a:t>
+              <a:t>3/12/20</a:t>
             </a:fld>
             <a:endParaRPr lang="en-US"/>
           </a:p>
@@ -3956,7 +3963,7 @@
           <a:p>
             <a:fld id="{D8DCDA63-C378-4D8D-91ED-C6497C5896B9}" type="datetimeFigureOut">
               <a:rPr lang="en-US" smtClean="0"/>
-              <a:t>3/11/2020</a:t>
+              <a:t>3/12/20</a:t>
             </a:fld>
             <a:endParaRPr lang="en-US"/>
           </a:p>
@@ -4051,7 +4058,7 @@
           <a:p>
             <a:fld id="{D8DCDA63-C378-4D8D-91ED-C6497C5896B9}" type="datetimeFigureOut">
               <a:rPr lang="en-US" smtClean="0"/>
-              <a:t>3/11/2020</a:t>
+              <a:t>3/12/20</a:t>
             </a:fld>
             <a:endParaRPr lang="en-US"/>
           </a:p>
@@ -4306,7 +4313,7 @@
           <a:p>
             <a:fld id="{D8DCDA63-C378-4D8D-91ED-C6497C5896B9}" type="datetimeFigureOut">
               <a:rPr lang="en-US" smtClean="0"/>
-              <a:t>3/11/2020</a:t>
+              <a:t>3/12/20</a:t>
             </a:fld>
             <a:endParaRPr lang="en-US"/>
           </a:p>
@@ -4569,7 +4576,7 @@
           <a:p>
             <a:fld id="{D8DCDA63-C378-4D8D-91ED-C6497C5896B9}" type="datetimeFigureOut">
               <a:rPr lang="en-US" smtClean="0"/>
-              <a:t>3/11/2020</a:t>
+              <a:t>3/12/20</a:t>
             </a:fld>
             <a:endParaRPr lang="en-US"/>
           </a:p>
@@ -5312,7 +5319,7 @@
           <a:p>
             <a:fld id="{D8DCDA63-C378-4D8D-91ED-C6497C5896B9}" type="datetimeFigureOut">
               <a:rPr lang="en-US" smtClean="0"/>
-              <a:t>3/11/2020</a:t>
+              <a:t>3/12/20</a:t>
             </a:fld>
             <a:endParaRPr lang="en-US"/>
           </a:p>
@@ -5969,165 +5976,6 @@
           <p:cNvPr id="2" name="Title 1">
             <a:extLst>
               <a:ext uri="{FF2B5EF4-FFF2-40B4-BE49-F238E27FC236}">
-                <a16:creationId xmlns:a16="http://schemas.microsoft.com/office/drawing/2014/main" id="{D4852A90-2B00-40CD-8D60-E12CC3A01DF5}"/>
-              </a:ext>
-            </a:extLst>
-          </p:cNvPr>
-          <p:cNvSpPr>
-            <a:spLocks noGrp="1"/>
-          </p:cNvSpPr>
-          <p:nvPr>
-            <p:ph type="title"/>
-          </p:nvPr>
-        </p:nvSpPr>
-        <p:spPr/>
-        <p:txBody>
-          <a:bodyPr/>
-          <a:lstStyle/>
-          <a:p>
-            <a:r>
-              <a:rPr lang="en-US" dirty="0" err="1"/>
-              <a:t>TouchPollingTask</a:t>
-            </a:r>
-            <a:endParaRPr lang="en-US" dirty="0"/>
-          </a:p>
-        </p:txBody>
-      </p:sp>
-    </p:spTree>
-    <p:extLst>
-      <p:ext uri="{BB962C8B-B14F-4D97-AF65-F5344CB8AC3E}">
-        <p14:creationId xmlns:p14="http://schemas.microsoft.com/office/powerpoint/2010/main" val="1763416746"/>
-      </p:ext>
-    </p:extLst>
-  </p:cSld>
-  <p:clrMapOvr>
-    <a:masterClrMapping/>
-  </p:clrMapOvr>
-</p:sld>
-</file>
-
-<file path=ppt/slides/slide11.xml><?xml version="1.0" encoding="utf-8"?>
-<p:sld xmlns:a="http://schemas.openxmlformats.org/drawingml/2006/main" xmlns:r="http://schemas.openxmlformats.org/officeDocument/2006/relationships" xmlns:p="http://schemas.openxmlformats.org/presentationml/2006/main">
-  <p:cSld>
-    <p:spTree>
-      <p:nvGrpSpPr>
-        <p:cNvPr id="1" name=""/>
-        <p:cNvGrpSpPr/>
-        <p:nvPr/>
-      </p:nvGrpSpPr>
-      <p:grpSpPr>
-        <a:xfrm>
-          <a:off x="0" y="0"/>
-          <a:ext cx="0" cy="0"/>
-          <a:chOff x="0" y="0"/>
-          <a:chExt cx="0" cy="0"/>
-        </a:xfrm>
-      </p:grpSpPr>
-      <p:sp>
-        <p:nvSpPr>
-          <p:cNvPr id="2" name="Title 1">
-            <a:extLst>
-              <a:ext uri="{FF2B5EF4-FFF2-40B4-BE49-F238E27FC236}">
-                <a16:creationId xmlns:a16="http://schemas.microsoft.com/office/drawing/2014/main" id="{75EDB837-B10F-4AED-B6CA-2355EB8FDEA3}"/>
-              </a:ext>
-            </a:extLst>
-          </p:cNvPr>
-          <p:cNvSpPr>
-            <a:spLocks noGrp="1"/>
-          </p:cNvSpPr>
-          <p:nvPr>
-            <p:ph type="title"/>
-          </p:nvPr>
-        </p:nvSpPr>
-        <p:spPr>
-          <a:xfrm>
-            <a:off x="4550218" y="0"/>
-            <a:ext cx="4897966" cy="1320800"/>
-          </a:xfrm>
-        </p:spPr>
-        <p:txBody>
-          <a:bodyPr/>
-          <a:lstStyle/>
-          <a:p>
-            <a:r>
-              <a:rPr lang="en-US" dirty="0" err="1"/>
-              <a:t>CommandHandlerTask</a:t>
-            </a:r>
-            <a:endParaRPr lang="en-US" dirty="0"/>
-          </a:p>
-        </p:txBody>
-      </p:sp>
-      <p:pic>
-        <p:nvPicPr>
-          <p:cNvPr id="6" name="Picture 5" descr="A screenshot of a cell phone&#10;&#10;Description automatically generated">
-            <a:extLst>
-              <a:ext uri="{FF2B5EF4-FFF2-40B4-BE49-F238E27FC236}">
-                <a16:creationId xmlns:a16="http://schemas.microsoft.com/office/drawing/2014/main" id="{EBF9DF9C-9F60-4529-A34A-ADDB329D4BAC}"/>
-              </a:ext>
-            </a:extLst>
-          </p:cNvPr>
-          <p:cNvPicPr>
-            <a:picLocks noChangeAspect="1"/>
-          </p:cNvPicPr>
-          <p:nvPr/>
-        </p:nvPicPr>
-        <p:blipFill>
-          <a:blip r:embed="rId2">
-            <a:extLst>
-              <a:ext uri="{28A0092B-C50C-407E-A947-70E740481C1C}">
-                <a14:useLocalDpi xmlns:a14="http://schemas.microsoft.com/office/drawing/2010/main" val="0"/>
-              </a:ext>
-            </a:extLst>
-          </a:blip>
-          <a:stretch>
-            <a:fillRect/>
-          </a:stretch>
-        </p:blipFill>
-        <p:spPr>
-          <a:xfrm>
-            <a:off x="238568" y="292100"/>
-            <a:ext cx="10934700" cy="6087567"/>
-          </a:xfrm>
-          <a:prstGeom prst="rect">
-            <a:avLst/>
-          </a:prstGeom>
-        </p:spPr>
-      </p:pic>
-    </p:spTree>
-    <p:extLst>
-      <p:ext uri="{BB962C8B-B14F-4D97-AF65-F5344CB8AC3E}">
-        <p14:creationId xmlns:p14="http://schemas.microsoft.com/office/powerpoint/2010/main" val="3807682051"/>
-      </p:ext>
-    </p:extLst>
-  </p:cSld>
-  <p:clrMapOvr>
-    <a:masterClrMapping/>
-  </p:clrMapOvr>
-</p:sld>
-</file>
-
-<file path=ppt/slides/slide12.xml><?xml version="1.0" encoding="utf-8"?>
-<p:sld xmlns:a="http://schemas.openxmlformats.org/drawingml/2006/main" xmlns:r="http://schemas.openxmlformats.org/officeDocument/2006/relationships" xmlns:p="http://schemas.openxmlformats.org/presentationml/2006/main">
-  <p:cSld>
-    <p:spTree>
-      <p:nvGrpSpPr>
-        <p:cNvPr id="1" name=""/>
-        <p:cNvGrpSpPr/>
-        <p:nvPr/>
-      </p:nvGrpSpPr>
-      <p:grpSpPr>
-        <a:xfrm>
-          <a:off x="0" y="0"/>
-          <a:ext cx="0" cy="0"/>
-          <a:chOff x="0" y="0"/>
-          <a:chExt cx="0" cy="0"/>
-        </a:xfrm>
-      </p:grpSpPr>
-      <p:sp>
-        <p:nvSpPr>
-          <p:cNvPr id="2" name="Title 1">
-            <a:extLst>
-              <a:ext uri="{FF2B5EF4-FFF2-40B4-BE49-F238E27FC236}">
                 <a16:creationId xmlns:a16="http://schemas.microsoft.com/office/drawing/2014/main" id="{719F676C-7126-4B32-9864-ABD450F3B082}"/>
               </a:ext>
             </a:extLst>
@@ -6206,7 +6054,7 @@
 </p:sld>
 </file>
 
-<file path=ppt/slides/slide13.xml><?xml version="1.0" encoding="utf-8"?>
+<file path=ppt/slides/slide11.xml><?xml version="1.0" encoding="utf-8"?>
 <p:sld xmlns:a="http://schemas.openxmlformats.org/drawingml/2006/main" xmlns:r="http://schemas.openxmlformats.org/officeDocument/2006/relationships" xmlns:p="http://schemas.openxmlformats.org/presentationml/2006/main">
   <p:cSld>
     <p:spTree>
@@ -6228,6 +6076,105 @@
           <p:cNvPr id="2" name="Title 1">
             <a:extLst>
               <a:ext uri="{FF2B5EF4-FFF2-40B4-BE49-F238E27FC236}">
+                <a16:creationId xmlns:a16="http://schemas.microsoft.com/office/drawing/2014/main" id="{66543A97-4A68-1C46-ACB8-35A2A127D92D}"/>
+              </a:ext>
+            </a:extLst>
+          </p:cNvPr>
+          <p:cNvSpPr>
+            <a:spLocks noGrp="1"/>
+          </p:cNvSpPr>
+          <p:nvPr>
+            <p:ph type="title"/>
+          </p:nvPr>
+        </p:nvSpPr>
+        <p:spPr>
+          <a:xfrm>
+            <a:off x="5700889" y="0"/>
+            <a:ext cx="3860799" cy="654756"/>
+          </a:xfrm>
+        </p:spPr>
+        <p:txBody>
+          <a:bodyPr/>
+          <a:lstStyle/>
+          <a:p>
+            <a:r>
+              <a:rPr lang="en-US" dirty="0"/>
+              <a:t>Mp3StreamSDFile</a:t>
+            </a:r>
+          </a:p>
+        </p:txBody>
+      </p:sp>
+      <p:pic>
+        <p:nvPicPr>
+          <p:cNvPr id="5" name="Picture 4">
+            <a:extLst>
+              <a:ext uri="{FF2B5EF4-FFF2-40B4-BE49-F238E27FC236}">
+                <a16:creationId xmlns:a16="http://schemas.microsoft.com/office/drawing/2014/main" id="{46DB8857-29B7-9A48-AD36-4F9874D8A186}"/>
+              </a:ext>
+            </a:extLst>
+          </p:cNvPr>
+          <p:cNvPicPr>
+            <a:picLocks noChangeAspect="1"/>
+          </p:cNvPicPr>
+          <p:nvPr/>
+        </p:nvPicPr>
+        <p:blipFill>
+          <a:blip r:embed="rId2">
+            <a:extLst>
+              <a:ext uri="{28A0092B-C50C-407E-A947-70E740481C1C}">
+                <a14:useLocalDpi xmlns:a14="http://schemas.microsoft.com/office/drawing/2010/main" val="0"/>
+              </a:ext>
+            </a:extLst>
+          </a:blip>
+          <a:stretch>
+            <a:fillRect/>
+          </a:stretch>
+        </p:blipFill>
+        <p:spPr>
+          <a:xfrm>
+            <a:off x="0" y="120650"/>
+            <a:ext cx="10299700" cy="6616700"/>
+          </a:xfrm>
+          <a:prstGeom prst="rect">
+            <a:avLst/>
+          </a:prstGeom>
+        </p:spPr>
+      </p:pic>
+    </p:spTree>
+    <p:extLst>
+      <p:ext uri="{BB962C8B-B14F-4D97-AF65-F5344CB8AC3E}">
+        <p14:creationId xmlns:p14="http://schemas.microsoft.com/office/powerpoint/2010/main" val="763050812"/>
+      </p:ext>
+    </p:extLst>
+  </p:cSld>
+  <p:clrMapOvr>
+    <a:masterClrMapping/>
+  </p:clrMapOvr>
+</p:sld>
+</file>
+
+<file path=ppt/slides/slide12.xml><?xml version="1.0" encoding="utf-8"?>
+<p:sld xmlns:a="http://schemas.openxmlformats.org/drawingml/2006/main" xmlns:r="http://schemas.openxmlformats.org/officeDocument/2006/relationships" xmlns:p="http://schemas.openxmlformats.org/presentationml/2006/main">
+  <p:cSld>
+    <p:spTree>
+      <p:nvGrpSpPr>
+        <p:cNvPr id="1" name=""/>
+        <p:cNvGrpSpPr/>
+        <p:nvPr/>
+      </p:nvGrpSpPr>
+      <p:grpSpPr>
+        <a:xfrm>
+          <a:off x="0" y="0"/>
+          <a:ext cx="0" cy="0"/>
+          <a:chOff x="0" y="0"/>
+          <a:chExt cx="0" cy="0"/>
+        </a:xfrm>
+      </p:grpSpPr>
+      <p:sp>
+        <p:nvSpPr>
+          <p:cNvPr id="2" name="Title 1">
+            <a:extLst>
+              <a:ext uri="{FF2B5EF4-FFF2-40B4-BE49-F238E27FC236}">
                 <a16:creationId xmlns:a16="http://schemas.microsoft.com/office/drawing/2014/main" id="{5DFD14A1-05BC-47C9-9C60-EF080006C2A0}"/>
               </a:ext>
             </a:extLst>
@@ -6241,8 +6188,8 @@
         </p:nvSpPr>
         <p:spPr>
           <a:xfrm>
-            <a:off x="3572934" y="0"/>
-            <a:ext cx="3627966" cy="1320800"/>
+            <a:off x="2297290" y="0"/>
+            <a:ext cx="3627966" cy="733778"/>
           </a:xfrm>
         </p:spPr>
         <p:txBody>
@@ -6285,7 +6232,7 @@
         </p:blipFill>
         <p:spPr>
           <a:xfrm>
-            <a:off x="1254889" y="393700"/>
+            <a:off x="142022" y="499190"/>
             <a:ext cx="10060811" cy="6358810"/>
           </a:xfrm>
           <a:prstGeom prst="rect">
@@ -6306,7 +6253,7 @@
 </p:sld>
 </file>
 
-<file path=ppt/slides/slide2.xml><?xml version="1.0" encoding="utf-8"?>
+<file path=ppt/slides/slide13.xml><?xml version="1.0" encoding="utf-8"?>
 <p:sld xmlns:a="http://schemas.openxmlformats.org/drawingml/2006/main" xmlns:r="http://schemas.openxmlformats.org/officeDocument/2006/relationships" xmlns:p="http://schemas.openxmlformats.org/presentationml/2006/main">
   <p:cSld>
     <p:spTree>
@@ -6328,7 +6275,7 @@
           <p:cNvPr id="2" name="Title 1">
             <a:extLst>
               <a:ext uri="{FF2B5EF4-FFF2-40B4-BE49-F238E27FC236}">
-                <a16:creationId xmlns:a16="http://schemas.microsoft.com/office/drawing/2014/main" id="{BD671E40-C0C8-4D67-A0B6-D4C88A04F06C}"/>
+                <a16:creationId xmlns:a16="http://schemas.microsoft.com/office/drawing/2014/main" id="{B1E49FBD-575A-4340-A474-5D5E7E5142CB}"/>
               </a:ext>
             </a:extLst>
           </p:cNvPr>
@@ -6347,7 +6294,7 @@
             <a:pPr algn="ctr"/>
             <a:r>
               <a:rPr lang="en-US" dirty="0"/>
-              <a:t>Features</a:t>
+              <a:t>Running the System</a:t>
             </a:r>
           </a:p>
         </p:txBody>
@@ -6357,7 +6304,7 @@
           <p:cNvPr id="3" name="Content Placeholder 2">
             <a:extLst>
               <a:ext uri="{FF2B5EF4-FFF2-40B4-BE49-F238E27FC236}">
-                <a16:creationId xmlns:a16="http://schemas.microsoft.com/office/drawing/2014/main" id="{23DF060B-1500-48AB-8970-3FA100AC22A5}"/>
+                <a16:creationId xmlns:a16="http://schemas.microsoft.com/office/drawing/2014/main" id="{54B314DA-9C36-4234-89B4-326076874AE0}"/>
               </a:ext>
             </a:extLst>
           </p:cNvPr>
@@ -6371,61 +6318,19 @@
         <p:spPr/>
         <p:txBody>
           <a:bodyPr>
-            <a:normAutofit lnSpcReduction="10000"/>
+            <a:normAutofit/>
           </a:bodyPr>
           <a:lstStyle/>
           <a:p>
             <a:r>
               <a:rPr lang="en-US" sz="2800" dirty="0"/>
-              <a:t>Required: Play/Stop</a:t>
+              <a:t>Generate the song list</a:t>
             </a:r>
           </a:p>
           <a:p>
             <a:r>
               <a:rPr lang="en-US" sz="2800" dirty="0"/>
-              <a:t>Additional:</a:t>
-            </a:r>
-          </a:p>
-          <a:p>
-            <a:pPr lvl="1"/>
-            <a:r>
-              <a:rPr lang="en-US" sz="2400" dirty="0"/>
-              <a:t>Pause</a:t>
-            </a:r>
-          </a:p>
-          <a:p>
-            <a:pPr lvl="1"/>
-            <a:r>
-              <a:rPr lang="en-US" sz="2400" dirty="0"/>
-              <a:t>Restart/Rewind</a:t>
-            </a:r>
-          </a:p>
-          <a:p>
-            <a:pPr lvl="1"/>
-            <a:r>
-              <a:rPr lang="en-US" sz="2400" dirty="0"/>
-              <a:t>Skip/Fast Forward</a:t>
-            </a:r>
-          </a:p>
-          <a:p>
-            <a:pPr lvl="1"/>
-            <a:r>
-              <a:rPr lang="en-US" sz="2400" dirty="0"/>
-              <a:t>Song Progress</a:t>
-            </a:r>
-          </a:p>
-          <a:p>
-            <a:pPr lvl="1"/>
-            <a:r>
-              <a:rPr lang="en-US" sz="2400" dirty="0"/>
-              <a:t>Volume Control</a:t>
-            </a:r>
-          </a:p>
-          <a:p>
-            <a:pPr lvl="1"/>
-            <a:r>
-              <a:rPr lang="en-US" sz="2400" dirty="0"/>
-              <a:t>Track Name Displayed</a:t>
+              <a:t>Controls Layout</a:t>
             </a:r>
           </a:p>
         </p:txBody>
@@ -6433,7 +6338,7 @@
     </p:spTree>
     <p:extLst>
       <p:ext uri="{BB962C8B-B14F-4D97-AF65-F5344CB8AC3E}">
-        <p14:creationId xmlns:p14="http://schemas.microsoft.com/office/powerpoint/2010/main" val="94824203"/>
+        <p14:creationId xmlns:p14="http://schemas.microsoft.com/office/powerpoint/2010/main" val="3056241565"/>
       </p:ext>
     </p:extLst>
   </p:cSld>
@@ -6443,7 +6348,7 @@
 </p:sld>
 </file>
 
-<file path=ppt/slides/slide3.xml><?xml version="1.0" encoding="utf-8"?>
+<file path=ppt/slides/slide14.xml><?xml version="1.0" encoding="utf-8"?>
 <p:sld xmlns:a="http://schemas.openxmlformats.org/drawingml/2006/main" xmlns:r="http://schemas.openxmlformats.org/officeDocument/2006/relationships" xmlns:p="http://schemas.openxmlformats.org/presentationml/2006/main">
   <p:cSld>
     <p:spTree>
@@ -6465,234 +6370,6 @@
           <p:cNvPr id="2" name="Title 1">
             <a:extLst>
               <a:ext uri="{FF2B5EF4-FFF2-40B4-BE49-F238E27FC236}">
-                <a16:creationId xmlns:a16="http://schemas.microsoft.com/office/drawing/2014/main" id="{CA4FBA55-360F-4B47-B2B7-851A53A63A8A}"/>
-              </a:ext>
-            </a:extLst>
-          </p:cNvPr>
-          <p:cNvSpPr>
-            <a:spLocks noGrp="1"/>
-          </p:cNvSpPr>
-          <p:nvPr>
-            <p:ph type="title"/>
-          </p:nvPr>
-        </p:nvSpPr>
-        <p:spPr/>
-        <p:txBody>
-          <a:bodyPr/>
-          <a:lstStyle/>
-          <a:p>
-            <a:pPr algn="ctr"/>
-            <a:r>
-              <a:rPr lang="en-US" dirty="0"/>
-              <a:t>Task Priorities</a:t>
-            </a:r>
-          </a:p>
-        </p:txBody>
-      </p:sp>
-      <p:sp>
-        <p:nvSpPr>
-          <p:cNvPr id="3" name="Content Placeholder 2">
-            <a:extLst>
-              <a:ext uri="{FF2B5EF4-FFF2-40B4-BE49-F238E27FC236}">
-                <a16:creationId xmlns:a16="http://schemas.microsoft.com/office/drawing/2014/main" id="{E6355394-D794-4E3E-97D6-1458597B51C9}"/>
-              </a:ext>
-            </a:extLst>
-          </p:cNvPr>
-          <p:cNvSpPr>
-            <a:spLocks noGrp="1"/>
-          </p:cNvSpPr>
-          <p:nvPr>
-            <p:ph idx="1"/>
-          </p:nvPr>
-        </p:nvSpPr>
-        <p:spPr/>
-        <p:txBody>
-          <a:bodyPr>
-            <a:normAutofit/>
-          </a:bodyPr>
-          <a:lstStyle/>
-          <a:p>
-            <a:r>
-              <a:rPr lang="en-US" sz="2800" dirty="0" err="1"/>
-              <a:t>InitializationTask</a:t>
-            </a:r>
-            <a:r>
-              <a:rPr lang="en-US" sz="2800" dirty="0"/>
-              <a:t>:			5</a:t>
-            </a:r>
-          </a:p>
-          <a:p>
-            <a:r>
-              <a:rPr lang="en-US" sz="2800" dirty="0" err="1"/>
-              <a:t>TouchPollingTask</a:t>
-            </a:r>
-            <a:r>
-              <a:rPr lang="en-US" sz="2800" dirty="0"/>
-              <a:t>:			6</a:t>
-            </a:r>
-          </a:p>
-          <a:p>
-            <a:r>
-              <a:rPr lang="en-US" sz="2800" dirty="0" err="1"/>
-              <a:t>CommandHandlerTask</a:t>
-            </a:r>
-            <a:r>
-              <a:rPr lang="en-US" sz="2800" dirty="0"/>
-              <a:t>:	7</a:t>
-            </a:r>
-          </a:p>
-          <a:p>
-            <a:r>
-              <a:rPr lang="en-US" sz="2800" dirty="0" err="1"/>
-              <a:t>LcdHandlerTask</a:t>
-            </a:r>
-            <a:r>
-              <a:rPr lang="en-US" sz="2800" dirty="0"/>
-              <a:t>:			8</a:t>
-            </a:r>
-          </a:p>
-          <a:p>
-            <a:r>
-              <a:rPr lang="en-US" sz="2800" dirty="0" err="1"/>
-              <a:t>StreamingTask</a:t>
-            </a:r>
-            <a:r>
-              <a:rPr lang="en-US" sz="2800" dirty="0"/>
-              <a:t>:			9</a:t>
-            </a:r>
-          </a:p>
-        </p:txBody>
-      </p:sp>
-    </p:spTree>
-    <p:extLst>
-      <p:ext uri="{BB962C8B-B14F-4D97-AF65-F5344CB8AC3E}">
-        <p14:creationId xmlns:p14="http://schemas.microsoft.com/office/powerpoint/2010/main" val="2953516789"/>
-      </p:ext>
-    </p:extLst>
-  </p:cSld>
-  <p:clrMapOvr>
-    <a:masterClrMapping/>
-  </p:clrMapOvr>
-</p:sld>
-</file>
-
-<file path=ppt/slides/slide4.xml><?xml version="1.0" encoding="utf-8"?>
-<p:sld xmlns:a="http://schemas.openxmlformats.org/drawingml/2006/main" xmlns:r="http://schemas.openxmlformats.org/officeDocument/2006/relationships" xmlns:p="http://schemas.openxmlformats.org/presentationml/2006/main">
-  <p:cSld>
-    <p:spTree>
-      <p:nvGrpSpPr>
-        <p:cNvPr id="1" name=""/>
-        <p:cNvGrpSpPr/>
-        <p:nvPr/>
-      </p:nvGrpSpPr>
-      <p:grpSpPr>
-        <a:xfrm>
-          <a:off x="0" y="0"/>
-          <a:ext cx="0" cy="0"/>
-          <a:chOff x="0" y="0"/>
-          <a:chExt cx="0" cy="0"/>
-        </a:xfrm>
-      </p:grpSpPr>
-      <p:sp>
-        <p:nvSpPr>
-          <p:cNvPr id="2" name="Title 1">
-            <a:extLst>
-              <a:ext uri="{FF2B5EF4-FFF2-40B4-BE49-F238E27FC236}">
-                <a16:creationId xmlns:a16="http://schemas.microsoft.com/office/drawing/2014/main" id="{B1E49FBD-575A-4340-A474-5D5E7E5142CB}"/>
-              </a:ext>
-            </a:extLst>
-          </p:cNvPr>
-          <p:cNvSpPr>
-            <a:spLocks noGrp="1"/>
-          </p:cNvSpPr>
-          <p:nvPr>
-            <p:ph type="title"/>
-          </p:nvPr>
-        </p:nvSpPr>
-        <p:spPr/>
-        <p:txBody>
-          <a:bodyPr/>
-          <a:lstStyle/>
-          <a:p>
-            <a:pPr algn="ctr"/>
-            <a:r>
-              <a:rPr lang="en-US" dirty="0"/>
-              <a:t>Running the System</a:t>
-            </a:r>
-          </a:p>
-        </p:txBody>
-      </p:sp>
-      <p:sp>
-        <p:nvSpPr>
-          <p:cNvPr id="3" name="Content Placeholder 2">
-            <a:extLst>
-              <a:ext uri="{FF2B5EF4-FFF2-40B4-BE49-F238E27FC236}">
-                <a16:creationId xmlns:a16="http://schemas.microsoft.com/office/drawing/2014/main" id="{54B314DA-9C36-4234-89B4-326076874AE0}"/>
-              </a:ext>
-            </a:extLst>
-          </p:cNvPr>
-          <p:cNvSpPr>
-            <a:spLocks noGrp="1"/>
-          </p:cNvSpPr>
-          <p:nvPr>
-            <p:ph idx="1"/>
-          </p:nvPr>
-        </p:nvSpPr>
-        <p:spPr/>
-        <p:txBody>
-          <a:bodyPr>
-            <a:normAutofit/>
-          </a:bodyPr>
-          <a:lstStyle/>
-          <a:p>
-            <a:r>
-              <a:rPr lang="en-US" sz="2800" dirty="0"/>
-              <a:t>Generate the song list</a:t>
-            </a:r>
-          </a:p>
-          <a:p>
-            <a:r>
-              <a:rPr lang="en-US" sz="2800" dirty="0"/>
-              <a:t>Controls Layout</a:t>
-            </a:r>
-          </a:p>
-        </p:txBody>
-      </p:sp>
-    </p:spTree>
-    <p:extLst>
-      <p:ext uri="{BB962C8B-B14F-4D97-AF65-F5344CB8AC3E}">
-        <p14:creationId xmlns:p14="http://schemas.microsoft.com/office/powerpoint/2010/main" val="3056241565"/>
-      </p:ext>
-    </p:extLst>
-  </p:cSld>
-  <p:clrMapOvr>
-    <a:masterClrMapping/>
-  </p:clrMapOvr>
-</p:sld>
-</file>
-
-<file path=ppt/slides/slide5.xml><?xml version="1.0" encoding="utf-8"?>
-<p:sld xmlns:a="http://schemas.openxmlformats.org/drawingml/2006/main" xmlns:r="http://schemas.openxmlformats.org/officeDocument/2006/relationships" xmlns:p="http://schemas.openxmlformats.org/presentationml/2006/main">
-  <p:cSld>
-    <p:spTree>
-      <p:nvGrpSpPr>
-        <p:cNvPr id="1" name=""/>
-        <p:cNvGrpSpPr/>
-        <p:nvPr/>
-      </p:nvGrpSpPr>
-      <p:grpSpPr>
-        <a:xfrm>
-          <a:off x="0" y="0"/>
-          <a:ext cx="0" cy="0"/>
-          <a:chOff x="0" y="0"/>
-          <a:chExt cx="0" cy="0"/>
-        </a:xfrm>
-      </p:grpSpPr>
-      <p:sp>
-        <p:nvSpPr>
-          <p:cNvPr id="2" name="Title 1">
-            <a:extLst>
-              <a:ext uri="{FF2B5EF4-FFF2-40B4-BE49-F238E27FC236}">
                 <a16:creationId xmlns:a16="http://schemas.microsoft.com/office/drawing/2014/main" id="{B5549C2F-0287-447D-89A6-58770AA23159}"/>
               </a:ext>
             </a:extLst>
@@ -6735,7 +6412,9 @@
         </p:nvSpPr>
         <p:spPr/>
         <p:txBody>
-          <a:bodyPr/>
+          <a:bodyPr>
+            <a:normAutofit lnSpcReduction="10000"/>
+          </a:bodyPr>
           <a:lstStyle/>
           <a:p>
             <a:r>
@@ -6805,7 +6484,33 @@
             <a:pPr lvl="1"/>
             <a:r>
               <a:rPr lang="en-US" dirty="0"/>
-              <a:t>Output format for .mp3 files is “track&lt;file number&gt;.mp3, &lt;song name&gt;.mp3”</a:t>
+              <a:t>Line format within </a:t>
+            </a:r>
+            <a:r>
+              <a:rPr lang="en-US" b="1" dirty="0" err="1"/>
+              <a:t>songs.</a:t>
+            </a:r>
+            <a:r>
+              <a:rPr lang="en-US" dirty="0" err="1"/>
+              <a:t>txt</a:t>
+            </a:r>
+            <a:r>
+              <a:rPr lang="en-US" dirty="0"/>
+              <a:t> (for .mp3 files):</a:t>
+            </a:r>
+          </a:p>
+          <a:p>
+            <a:pPr lvl="2"/>
+            <a:r>
+              <a:rPr lang="en-US" dirty="0"/>
+              <a:t>“track&lt;file number&gt;.mp3, &lt;song name&gt;.mp3”</a:t>
+            </a:r>
+          </a:p>
+          <a:p>
+            <a:pPr lvl="2"/>
+            <a:r>
+              <a:rPr lang="en-US" dirty="0"/>
+              <a:t>Ex: track004.mp3, Involuntary Doppelganger.mp3</a:t>
             </a:r>
           </a:p>
           <a:p>
@@ -6837,7 +6542,7 @@
 </p:sld>
 </file>
 
-<file path=ppt/slides/slide6.xml><?xml version="1.0" encoding="utf-8"?>
+<file path=ppt/slides/slide15.xml><?xml version="1.0" encoding="utf-8"?>
 <p:sld xmlns:a="http://schemas.openxmlformats.org/drawingml/2006/main" xmlns:r="http://schemas.openxmlformats.org/officeDocument/2006/relationships" xmlns:p="http://schemas.openxmlformats.org/presentationml/2006/main">
   <p:cSld>
     <p:spTree>
@@ -6932,7 +6637,7 @@
 </p:sld>
 </file>
 
-<file path=ppt/slides/slide7.xml><?xml version="1.0" encoding="utf-8"?>
+<file path=ppt/slides/slide2.xml><?xml version="1.0" encoding="utf-8"?>
 <p:sld xmlns:a="http://schemas.openxmlformats.org/drawingml/2006/main" xmlns:r="http://schemas.openxmlformats.org/officeDocument/2006/relationships" xmlns:p="http://schemas.openxmlformats.org/presentationml/2006/main">
   <p:cSld>
     <p:spTree>
@@ -6954,6 +6659,276 @@
           <p:cNvPr id="2" name="Title 1">
             <a:extLst>
               <a:ext uri="{FF2B5EF4-FFF2-40B4-BE49-F238E27FC236}">
+                <a16:creationId xmlns:a16="http://schemas.microsoft.com/office/drawing/2014/main" id="{BD671E40-C0C8-4D67-A0B6-D4C88A04F06C}"/>
+              </a:ext>
+            </a:extLst>
+          </p:cNvPr>
+          <p:cNvSpPr>
+            <a:spLocks noGrp="1"/>
+          </p:cNvSpPr>
+          <p:nvPr>
+            <p:ph type="title"/>
+          </p:nvPr>
+        </p:nvSpPr>
+        <p:spPr/>
+        <p:txBody>
+          <a:bodyPr/>
+          <a:lstStyle/>
+          <a:p>
+            <a:pPr algn="ctr"/>
+            <a:r>
+              <a:rPr lang="en-US" dirty="0"/>
+              <a:t>Features</a:t>
+            </a:r>
+          </a:p>
+        </p:txBody>
+      </p:sp>
+      <p:sp>
+        <p:nvSpPr>
+          <p:cNvPr id="3" name="Content Placeholder 2">
+            <a:extLst>
+              <a:ext uri="{FF2B5EF4-FFF2-40B4-BE49-F238E27FC236}">
+                <a16:creationId xmlns:a16="http://schemas.microsoft.com/office/drawing/2014/main" id="{23DF060B-1500-48AB-8970-3FA100AC22A5}"/>
+              </a:ext>
+            </a:extLst>
+          </p:cNvPr>
+          <p:cNvSpPr>
+            <a:spLocks noGrp="1"/>
+          </p:cNvSpPr>
+          <p:nvPr>
+            <p:ph idx="1"/>
+          </p:nvPr>
+        </p:nvSpPr>
+        <p:spPr/>
+        <p:txBody>
+          <a:bodyPr>
+            <a:normAutofit lnSpcReduction="10000"/>
+          </a:bodyPr>
+          <a:lstStyle/>
+          <a:p>
+            <a:r>
+              <a:rPr lang="en-US" sz="2800" dirty="0"/>
+              <a:t>Required: Play/Stop</a:t>
+            </a:r>
+          </a:p>
+          <a:p>
+            <a:r>
+              <a:rPr lang="en-US" sz="2800" dirty="0"/>
+              <a:t>Additional:</a:t>
+            </a:r>
+          </a:p>
+          <a:p>
+            <a:pPr lvl="1"/>
+            <a:r>
+              <a:rPr lang="en-US" sz="2400" dirty="0"/>
+              <a:t>Pause</a:t>
+            </a:r>
+          </a:p>
+          <a:p>
+            <a:pPr lvl="1"/>
+            <a:r>
+              <a:rPr lang="en-US" sz="2400" dirty="0"/>
+              <a:t>Restart/Rewind</a:t>
+            </a:r>
+          </a:p>
+          <a:p>
+            <a:pPr lvl="1"/>
+            <a:r>
+              <a:rPr lang="en-US" sz="2400" dirty="0"/>
+              <a:t>Skip/Fast Forward</a:t>
+            </a:r>
+          </a:p>
+          <a:p>
+            <a:pPr lvl="1"/>
+            <a:r>
+              <a:rPr lang="en-US" sz="2400" dirty="0"/>
+              <a:t>Song Progress</a:t>
+            </a:r>
+          </a:p>
+          <a:p>
+            <a:pPr lvl="1"/>
+            <a:r>
+              <a:rPr lang="en-US" sz="2400" dirty="0"/>
+              <a:t>Volume Control</a:t>
+            </a:r>
+          </a:p>
+          <a:p>
+            <a:pPr lvl="1"/>
+            <a:r>
+              <a:rPr lang="en-US" sz="2400" dirty="0"/>
+              <a:t>Track Name Displayed</a:t>
+            </a:r>
+          </a:p>
+        </p:txBody>
+      </p:sp>
+    </p:spTree>
+    <p:extLst>
+      <p:ext uri="{BB962C8B-B14F-4D97-AF65-F5344CB8AC3E}">
+        <p14:creationId xmlns:p14="http://schemas.microsoft.com/office/powerpoint/2010/main" val="94824203"/>
+      </p:ext>
+    </p:extLst>
+  </p:cSld>
+  <p:clrMapOvr>
+    <a:masterClrMapping/>
+  </p:clrMapOvr>
+</p:sld>
+</file>
+
+<file path=ppt/slides/slide3.xml><?xml version="1.0" encoding="utf-8"?>
+<p:sld xmlns:a="http://schemas.openxmlformats.org/drawingml/2006/main" xmlns:r="http://schemas.openxmlformats.org/officeDocument/2006/relationships" xmlns:p="http://schemas.openxmlformats.org/presentationml/2006/main">
+  <p:cSld>
+    <p:spTree>
+      <p:nvGrpSpPr>
+        <p:cNvPr id="1" name=""/>
+        <p:cNvGrpSpPr/>
+        <p:nvPr/>
+      </p:nvGrpSpPr>
+      <p:grpSpPr>
+        <a:xfrm>
+          <a:off x="0" y="0"/>
+          <a:ext cx="0" cy="0"/>
+          <a:chOff x="0" y="0"/>
+          <a:chExt cx="0" cy="0"/>
+        </a:xfrm>
+      </p:grpSpPr>
+      <p:sp>
+        <p:nvSpPr>
+          <p:cNvPr id="2" name="Title 1">
+            <a:extLst>
+              <a:ext uri="{FF2B5EF4-FFF2-40B4-BE49-F238E27FC236}">
+                <a16:creationId xmlns:a16="http://schemas.microsoft.com/office/drawing/2014/main" id="{CA4FBA55-360F-4B47-B2B7-851A53A63A8A}"/>
+              </a:ext>
+            </a:extLst>
+          </p:cNvPr>
+          <p:cNvSpPr>
+            <a:spLocks noGrp="1"/>
+          </p:cNvSpPr>
+          <p:nvPr>
+            <p:ph type="title"/>
+          </p:nvPr>
+        </p:nvSpPr>
+        <p:spPr/>
+        <p:txBody>
+          <a:bodyPr/>
+          <a:lstStyle/>
+          <a:p>
+            <a:pPr algn="ctr"/>
+            <a:r>
+              <a:rPr lang="en-US" dirty="0"/>
+              <a:t>Task Priorities</a:t>
+            </a:r>
+          </a:p>
+        </p:txBody>
+      </p:sp>
+      <p:sp>
+        <p:nvSpPr>
+          <p:cNvPr id="3" name="Content Placeholder 2">
+            <a:extLst>
+              <a:ext uri="{FF2B5EF4-FFF2-40B4-BE49-F238E27FC236}">
+                <a16:creationId xmlns:a16="http://schemas.microsoft.com/office/drawing/2014/main" id="{E6355394-D794-4E3E-97D6-1458597B51C9}"/>
+              </a:ext>
+            </a:extLst>
+          </p:cNvPr>
+          <p:cNvSpPr>
+            <a:spLocks noGrp="1"/>
+          </p:cNvSpPr>
+          <p:nvPr>
+            <p:ph idx="1"/>
+          </p:nvPr>
+        </p:nvSpPr>
+        <p:spPr/>
+        <p:txBody>
+          <a:bodyPr>
+            <a:normAutofit/>
+          </a:bodyPr>
+          <a:lstStyle/>
+          <a:p>
+            <a:r>
+              <a:rPr lang="en-US" sz="2800" dirty="0" err="1"/>
+              <a:t>InitializationTask</a:t>
+            </a:r>
+            <a:r>
+              <a:rPr lang="en-US" sz="2800" dirty="0"/>
+              <a:t>:			5</a:t>
+            </a:r>
+          </a:p>
+          <a:p>
+            <a:r>
+              <a:rPr lang="en-US" sz="2800" dirty="0" err="1"/>
+              <a:t>TouchPollingTask</a:t>
+            </a:r>
+            <a:r>
+              <a:rPr lang="en-US" sz="2800" dirty="0"/>
+              <a:t>:			6</a:t>
+            </a:r>
+          </a:p>
+          <a:p>
+            <a:r>
+              <a:rPr lang="en-US" sz="2800" dirty="0" err="1"/>
+              <a:t>CommandHandlerTask</a:t>
+            </a:r>
+            <a:r>
+              <a:rPr lang="en-US" sz="2800" dirty="0"/>
+              <a:t>:	7</a:t>
+            </a:r>
+          </a:p>
+          <a:p>
+            <a:r>
+              <a:rPr lang="en-US" sz="2800" dirty="0" err="1"/>
+              <a:t>LcdHandlerTask</a:t>
+            </a:r>
+            <a:r>
+              <a:rPr lang="en-US" sz="2800" dirty="0"/>
+              <a:t>:			8</a:t>
+            </a:r>
+          </a:p>
+          <a:p>
+            <a:r>
+              <a:rPr lang="en-US" sz="2800" dirty="0" err="1"/>
+              <a:t>StreamingTask</a:t>
+            </a:r>
+            <a:r>
+              <a:rPr lang="en-US" sz="2800" dirty="0"/>
+              <a:t>:			9</a:t>
+            </a:r>
+          </a:p>
+        </p:txBody>
+      </p:sp>
+    </p:spTree>
+    <p:extLst>
+      <p:ext uri="{BB962C8B-B14F-4D97-AF65-F5344CB8AC3E}">
+        <p14:creationId xmlns:p14="http://schemas.microsoft.com/office/powerpoint/2010/main" val="2953516789"/>
+      </p:ext>
+    </p:extLst>
+  </p:cSld>
+  <p:clrMapOvr>
+    <a:masterClrMapping/>
+  </p:clrMapOvr>
+</p:sld>
+</file>
+
+<file path=ppt/slides/slide4.xml><?xml version="1.0" encoding="utf-8"?>
+<p:sld xmlns:a="http://schemas.openxmlformats.org/drawingml/2006/main" xmlns:r="http://schemas.openxmlformats.org/officeDocument/2006/relationships" xmlns:p="http://schemas.openxmlformats.org/presentationml/2006/main">
+  <p:cSld>
+    <p:spTree>
+      <p:nvGrpSpPr>
+        <p:cNvPr id="1" name=""/>
+        <p:cNvGrpSpPr/>
+        <p:nvPr/>
+      </p:nvGrpSpPr>
+      <p:grpSpPr>
+        <a:xfrm>
+          <a:off x="0" y="0"/>
+          <a:ext cx="0" cy="0"/>
+          <a:chOff x="0" y="0"/>
+          <a:chExt cx="0" cy="0"/>
+        </a:xfrm>
+      </p:grpSpPr>
+      <p:sp>
+        <p:nvSpPr>
+          <p:cNvPr id="2" name="Title 1">
+            <a:extLst>
+              <a:ext uri="{FF2B5EF4-FFF2-40B4-BE49-F238E27FC236}">
                 <a16:creationId xmlns:a16="http://schemas.microsoft.com/office/drawing/2014/main" id="{D6783D04-FE6C-42F8-9B77-538995954551}"/>
               </a:ext>
             </a:extLst>
@@ -6965,15 +6940,20 @@
             <p:ph type="title"/>
           </p:nvPr>
         </p:nvSpPr>
-        <p:spPr/>
-        <p:txBody>
-          <a:bodyPr/>
+        <p:spPr>
+          <a:xfrm>
+            <a:off x="492172" y="0"/>
+            <a:ext cx="8596668" cy="1320800"/>
+          </a:xfrm>
+        </p:spPr>
+        <p:txBody>
+          <a:bodyPr anchor="ctr"/>
           <a:lstStyle/>
           <a:p>
             <a:pPr algn="ctr"/>
             <a:r>
               <a:rPr lang="en-US" dirty="0"/>
-              <a:t>Data Sent via Message Mailboxes</a:t>
+              <a:t>Task Communication</a:t>
             </a:r>
           </a:p>
         </p:txBody>
@@ -7027,7 +7007,7 @@
 </p:sld>
 </file>
 
-<file path=ppt/slides/slide8.xml><?xml version="1.0" encoding="utf-8"?>
+<file path=ppt/slides/slide5.xml><?xml version="1.0" encoding="utf-8"?>
 <p:sld xmlns:a="http://schemas.openxmlformats.org/drawingml/2006/main" xmlns:r="http://schemas.openxmlformats.org/officeDocument/2006/relationships" xmlns:p="http://schemas.openxmlformats.org/presentationml/2006/main">
   <p:cSld>
     <p:spTree>
@@ -7122,6 +7102,362 @@
 </p:sld>
 </file>
 
+<file path=ppt/slides/slide6.xml><?xml version="1.0" encoding="utf-8"?>
+<p:sld xmlns:a="http://schemas.openxmlformats.org/drawingml/2006/main" xmlns:r="http://schemas.openxmlformats.org/officeDocument/2006/relationships" xmlns:p="http://schemas.openxmlformats.org/presentationml/2006/main">
+  <p:cSld>
+    <p:spTree>
+      <p:nvGrpSpPr>
+        <p:cNvPr id="1" name=""/>
+        <p:cNvGrpSpPr/>
+        <p:nvPr/>
+      </p:nvGrpSpPr>
+      <p:grpSpPr>
+        <a:xfrm>
+          <a:off x="0" y="0"/>
+          <a:ext cx="0" cy="0"/>
+          <a:chOff x="0" y="0"/>
+          <a:chExt cx="0" cy="0"/>
+        </a:xfrm>
+      </p:grpSpPr>
+      <p:sp>
+        <p:nvSpPr>
+          <p:cNvPr id="2" name="Title 1">
+            <a:extLst>
+              <a:ext uri="{FF2B5EF4-FFF2-40B4-BE49-F238E27FC236}">
+                <a16:creationId xmlns:a16="http://schemas.microsoft.com/office/drawing/2014/main" id="{58124E1A-74C3-3342-A71A-3A4A723BAAAA}"/>
+              </a:ext>
+            </a:extLst>
+          </p:cNvPr>
+          <p:cNvSpPr>
+            <a:spLocks noGrp="1"/>
+          </p:cNvSpPr>
+          <p:nvPr>
+            <p:ph type="title"/>
+          </p:nvPr>
+        </p:nvSpPr>
+        <p:spPr/>
+        <p:txBody>
+          <a:bodyPr vert="horz" anchor="ctr"/>
+          <a:lstStyle/>
+          <a:p>
+            <a:pPr algn="ctr"/>
+            <a:r>
+              <a:rPr lang="en-US" dirty="0"/>
+              <a:t>Details</a:t>
+            </a:r>
+          </a:p>
+        </p:txBody>
+      </p:sp>
+      <p:sp>
+        <p:nvSpPr>
+          <p:cNvPr id="3" name="Content Placeholder 2">
+            <a:extLst>
+              <a:ext uri="{FF2B5EF4-FFF2-40B4-BE49-F238E27FC236}">
+                <a16:creationId xmlns:a16="http://schemas.microsoft.com/office/drawing/2014/main" id="{BDEDB17D-810D-C847-AE01-CCB008A13219}"/>
+              </a:ext>
+            </a:extLst>
+          </p:cNvPr>
+          <p:cNvSpPr>
+            <a:spLocks noGrp="1"/>
+          </p:cNvSpPr>
+          <p:nvPr>
+            <p:ph idx="1"/>
+          </p:nvPr>
+        </p:nvSpPr>
+        <p:spPr/>
+        <p:txBody>
+          <a:bodyPr>
+            <a:normAutofit fontScale="92500" lnSpcReduction="10000"/>
+          </a:bodyPr>
+          <a:lstStyle/>
+          <a:p>
+            <a:r>
+              <a:rPr lang="en-US" dirty="0" err="1"/>
+              <a:t>InitializationTask</a:t>
+            </a:r>
+            <a:r>
+              <a:rPr lang="en-US" dirty="0"/>
+              <a:t>() synchronizes on tasks being initialized; prevents </a:t>
+            </a:r>
+            <a:r>
+              <a:rPr lang="en-US" dirty="0" err="1"/>
+              <a:t>TouchPollingTask</a:t>
+            </a:r>
+            <a:r>
+              <a:rPr lang="en-US" dirty="0"/>
+              <a:t>() and </a:t>
+            </a:r>
+            <a:r>
+              <a:rPr lang="en-US" dirty="0" err="1"/>
+              <a:t>LcdHandlerTask</a:t>
+            </a:r>
+            <a:r>
+              <a:rPr lang="en-US" dirty="0"/>
+              <a:t>() from starting if a task encounters an error before fully initializing.</a:t>
+            </a:r>
+          </a:p>
+          <a:p>
+            <a:r>
+              <a:rPr lang="en-US" dirty="0" err="1"/>
+              <a:t>TouchPollingTask</a:t>
+            </a:r>
+            <a:r>
+              <a:rPr lang="en-US" dirty="0"/>
+              <a:t>() sends only a single message when a button is pressed; 3 exceptions: holding play/skip/restart buttons have additional functionality.</a:t>
+            </a:r>
+          </a:p>
+          <a:p>
+            <a:r>
+              <a:rPr lang="en-US" dirty="0" err="1"/>
+              <a:t>CommandHandlerTask</a:t>
+            </a:r>
+            <a:r>
+              <a:rPr lang="en-US" dirty="0"/>
+              <a:t>() pends on the message received from </a:t>
+            </a:r>
+            <a:r>
+              <a:rPr lang="en-US" dirty="0" err="1"/>
+              <a:t>TouchPollingTask</a:t>
+            </a:r>
+            <a:r>
+              <a:rPr lang="en-US" dirty="0"/>
+              <a:t>() and then sends messages to </a:t>
+            </a:r>
+            <a:r>
+              <a:rPr lang="en-US" dirty="0" err="1"/>
+              <a:t>StreamingTask</a:t>
+            </a:r>
+            <a:r>
+              <a:rPr lang="en-US" dirty="0"/>
+              <a:t>() and </a:t>
+            </a:r>
+            <a:r>
+              <a:rPr lang="en-US" dirty="0" err="1"/>
+              <a:t>LcdHandlerTask</a:t>
+            </a:r>
+            <a:r>
+              <a:rPr lang="en-US" dirty="0"/>
+              <a:t>().</a:t>
+            </a:r>
+          </a:p>
+          <a:p>
+            <a:r>
+              <a:rPr lang="en-US" dirty="0" err="1"/>
+              <a:t>StreamingTask</a:t>
+            </a:r>
+            <a:r>
+              <a:rPr lang="en-US" dirty="0"/>
+              <a:t>() polls for the play/skip/restart commands; Mp3StreamSDFile() within the task polls for play/stop/pause/skip/restart/fast forward/rewind/volume up/volume down commands.  Sends track name and song progress to </a:t>
+            </a:r>
+            <a:r>
+              <a:rPr lang="en-US" dirty="0" err="1"/>
+              <a:t>LcdHandlerTask</a:t>
+            </a:r>
+            <a:r>
+              <a:rPr lang="en-US" dirty="0"/>
+              <a:t>().</a:t>
+            </a:r>
+          </a:p>
+          <a:p>
+            <a:r>
+              <a:rPr lang="en-US" dirty="0" err="1"/>
+              <a:t>LcdHandlerTask</a:t>
+            </a:r>
+            <a:r>
+              <a:rPr lang="en-US" dirty="0"/>
+              <a:t>() polls for 4 </a:t>
+            </a:r>
+            <a:r>
+              <a:rPr lang="en-US"/>
+              <a:t>different messages for </a:t>
+            </a:r>
+            <a:r>
+              <a:rPr lang="en-US" dirty="0"/>
+              <a:t>updating the GUI: 1 from </a:t>
+            </a:r>
+            <a:r>
+              <a:rPr lang="en-US" dirty="0" err="1"/>
+              <a:t>TouchPollingTask</a:t>
+            </a:r>
+            <a:r>
+              <a:rPr lang="en-US" dirty="0"/>
+              <a:t>(), 1 from </a:t>
+            </a:r>
+            <a:r>
+              <a:rPr lang="en-US" dirty="0" err="1"/>
+              <a:t>CommandHandlerTask</a:t>
+            </a:r>
+            <a:r>
+              <a:rPr lang="en-US" dirty="0"/>
+              <a:t>(), and 2 from </a:t>
+            </a:r>
+            <a:r>
+              <a:rPr lang="en-US" dirty="0" err="1"/>
+              <a:t>StreamingTask</a:t>
+            </a:r>
+            <a:r>
+              <a:rPr lang="en-US" dirty="0"/>
+              <a:t>().</a:t>
+            </a:r>
+          </a:p>
+        </p:txBody>
+      </p:sp>
+    </p:spTree>
+    <p:extLst>
+      <p:ext uri="{BB962C8B-B14F-4D97-AF65-F5344CB8AC3E}">
+        <p14:creationId xmlns:p14="http://schemas.microsoft.com/office/powerpoint/2010/main" val="2545223388"/>
+      </p:ext>
+    </p:extLst>
+  </p:cSld>
+  <p:clrMapOvr>
+    <a:masterClrMapping/>
+  </p:clrMapOvr>
+</p:sld>
+</file>
+
+<file path=ppt/slides/slide7.xml><?xml version="1.0" encoding="utf-8"?>
+<p:sld xmlns:a="http://schemas.openxmlformats.org/drawingml/2006/main" xmlns:r="http://schemas.openxmlformats.org/officeDocument/2006/relationships" xmlns:p="http://schemas.openxmlformats.org/presentationml/2006/main">
+  <p:cSld>
+    <p:spTree>
+      <p:nvGrpSpPr>
+        <p:cNvPr id="1" name=""/>
+        <p:cNvGrpSpPr/>
+        <p:nvPr/>
+      </p:nvGrpSpPr>
+      <p:grpSpPr>
+        <a:xfrm>
+          <a:off x="0" y="0"/>
+          <a:ext cx="0" cy="0"/>
+          <a:chOff x="0" y="0"/>
+          <a:chExt cx="0" cy="0"/>
+        </a:xfrm>
+      </p:grpSpPr>
+      <p:sp>
+        <p:nvSpPr>
+          <p:cNvPr id="2" name="Title 1">
+            <a:extLst>
+              <a:ext uri="{FF2B5EF4-FFF2-40B4-BE49-F238E27FC236}">
+                <a16:creationId xmlns:a16="http://schemas.microsoft.com/office/drawing/2014/main" id="{AD0C1C72-DE63-42D5-A290-281E255E5C8B}"/>
+              </a:ext>
+            </a:extLst>
+          </p:cNvPr>
+          <p:cNvSpPr>
+            <a:spLocks noGrp="1"/>
+          </p:cNvSpPr>
+          <p:nvPr>
+            <p:ph type="title"/>
+          </p:nvPr>
+        </p:nvSpPr>
+        <p:spPr/>
+        <p:txBody>
+          <a:bodyPr/>
+          <a:lstStyle/>
+          <a:p>
+            <a:r>
+              <a:rPr lang="en-US" dirty="0" err="1"/>
+              <a:t>InitializationTask</a:t>
+            </a:r>
+            <a:endParaRPr lang="en-US" dirty="0"/>
+          </a:p>
+        </p:txBody>
+      </p:sp>
+      <p:sp>
+        <p:nvSpPr>
+          <p:cNvPr id="3" name="Content Placeholder 2">
+            <a:extLst>
+              <a:ext uri="{FF2B5EF4-FFF2-40B4-BE49-F238E27FC236}">
+                <a16:creationId xmlns:a16="http://schemas.microsoft.com/office/drawing/2014/main" id="{F1482B70-E152-43F2-A15C-97E40B6AC719}"/>
+              </a:ext>
+            </a:extLst>
+          </p:cNvPr>
+          <p:cNvSpPr>
+            <a:spLocks noGrp="1"/>
+          </p:cNvSpPr>
+          <p:nvPr>
+            <p:ph idx="1"/>
+          </p:nvPr>
+        </p:nvSpPr>
+        <p:spPr/>
+        <p:txBody>
+          <a:bodyPr/>
+          <a:lstStyle/>
+          <a:p>
+            <a:endParaRPr lang="en-US"/>
+          </a:p>
+        </p:txBody>
+      </p:sp>
+    </p:spTree>
+    <p:extLst>
+      <p:ext uri="{BB962C8B-B14F-4D97-AF65-F5344CB8AC3E}">
+        <p14:creationId xmlns:p14="http://schemas.microsoft.com/office/powerpoint/2010/main" val="2321027947"/>
+      </p:ext>
+    </p:extLst>
+  </p:cSld>
+  <p:clrMapOvr>
+    <a:masterClrMapping/>
+  </p:clrMapOvr>
+</p:sld>
+</file>
+
+<file path=ppt/slides/slide8.xml><?xml version="1.0" encoding="utf-8"?>
+<p:sld xmlns:a="http://schemas.openxmlformats.org/drawingml/2006/main" xmlns:r="http://schemas.openxmlformats.org/officeDocument/2006/relationships" xmlns:p="http://schemas.openxmlformats.org/presentationml/2006/main">
+  <p:cSld>
+    <p:spTree>
+      <p:nvGrpSpPr>
+        <p:cNvPr id="1" name=""/>
+        <p:cNvGrpSpPr/>
+        <p:nvPr/>
+      </p:nvGrpSpPr>
+      <p:grpSpPr>
+        <a:xfrm>
+          <a:off x="0" y="0"/>
+          <a:ext cx="0" cy="0"/>
+          <a:chOff x="0" y="0"/>
+          <a:chExt cx="0" cy="0"/>
+        </a:xfrm>
+      </p:grpSpPr>
+      <p:sp>
+        <p:nvSpPr>
+          <p:cNvPr id="2" name="Title 1">
+            <a:extLst>
+              <a:ext uri="{FF2B5EF4-FFF2-40B4-BE49-F238E27FC236}">
+                <a16:creationId xmlns:a16="http://schemas.microsoft.com/office/drawing/2014/main" id="{D4852A90-2B00-40CD-8D60-E12CC3A01DF5}"/>
+              </a:ext>
+            </a:extLst>
+          </p:cNvPr>
+          <p:cNvSpPr>
+            <a:spLocks noGrp="1"/>
+          </p:cNvSpPr>
+          <p:nvPr>
+            <p:ph type="title"/>
+          </p:nvPr>
+        </p:nvSpPr>
+        <p:spPr/>
+        <p:txBody>
+          <a:bodyPr/>
+          <a:lstStyle/>
+          <a:p>
+            <a:r>
+              <a:rPr lang="en-US" dirty="0" err="1"/>
+              <a:t>TouchPollingTask</a:t>
+            </a:r>
+            <a:endParaRPr lang="en-US" dirty="0"/>
+          </a:p>
+        </p:txBody>
+      </p:sp>
+    </p:spTree>
+    <p:extLst>
+      <p:ext uri="{BB962C8B-B14F-4D97-AF65-F5344CB8AC3E}">
+        <p14:creationId xmlns:p14="http://schemas.microsoft.com/office/powerpoint/2010/main" val="1763416746"/>
+      </p:ext>
+    </p:extLst>
+  </p:cSld>
+  <p:clrMapOvr>
+    <a:masterClrMapping/>
+  </p:clrMapOvr>
+</p:sld>
+</file>
+
 <file path=ppt/slides/slide9.xml><?xml version="1.0" encoding="utf-8"?>
 <p:sld xmlns:a="http://schemas.openxmlformats.org/drawingml/2006/main" xmlns:r="http://schemas.openxmlformats.org/officeDocument/2006/relationships" xmlns:p="http://schemas.openxmlformats.org/presentationml/2006/main">
   <p:cSld>
@@ -7144,7 +7480,7 @@
           <p:cNvPr id="2" name="Title 1">
             <a:extLst>
               <a:ext uri="{FF2B5EF4-FFF2-40B4-BE49-F238E27FC236}">
-                <a16:creationId xmlns:a16="http://schemas.microsoft.com/office/drawing/2014/main" id="{AD0C1C72-DE63-42D5-A290-281E255E5C8B}"/>
+                <a16:creationId xmlns:a16="http://schemas.microsoft.com/office/drawing/2014/main" id="{75EDB837-B10F-4AED-B6CA-2355EB8FDEA3}"/>
               </a:ext>
             </a:extLst>
           </p:cNvPr>
@@ -7155,48 +7491,64 @@
             <p:ph type="title"/>
           </p:nvPr>
         </p:nvSpPr>
-        <p:spPr/>
+        <p:spPr>
+          <a:xfrm>
+            <a:off x="4550218" y="0"/>
+            <a:ext cx="4897966" cy="1320800"/>
+          </a:xfrm>
+        </p:spPr>
         <p:txBody>
           <a:bodyPr/>
           <a:lstStyle/>
           <a:p>
             <a:r>
               <a:rPr lang="en-US" dirty="0" err="1"/>
-              <a:t>InitializationTask</a:t>
+              <a:t>CommandHandlerTask</a:t>
             </a:r>
             <a:endParaRPr lang="en-US" dirty="0"/>
           </a:p>
         </p:txBody>
       </p:sp>
-      <p:sp>
-        <p:nvSpPr>
-          <p:cNvPr id="3" name="Content Placeholder 2">
+      <p:pic>
+        <p:nvPicPr>
+          <p:cNvPr id="6" name="Picture 5" descr="A screenshot of a cell phone&#10;&#10;Description automatically generated">
             <a:extLst>
               <a:ext uri="{FF2B5EF4-FFF2-40B4-BE49-F238E27FC236}">
-                <a16:creationId xmlns:a16="http://schemas.microsoft.com/office/drawing/2014/main" id="{F1482B70-E152-43F2-A15C-97E40B6AC719}"/>
+                <a16:creationId xmlns:a16="http://schemas.microsoft.com/office/drawing/2014/main" id="{EBF9DF9C-9F60-4529-A34A-ADDB329D4BAC}"/>
               </a:ext>
             </a:extLst>
           </p:cNvPr>
-          <p:cNvSpPr>
-            <a:spLocks noGrp="1"/>
-          </p:cNvSpPr>
-          <p:nvPr>
-            <p:ph idx="1"/>
-          </p:nvPr>
-        </p:nvSpPr>
-        <p:spPr/>
-        <p:txBody>
-          <a:bodyPr/>
-          <a:lstStyle/>
-          <a:p>
-            <a:endParaRPr lang="en-US"/>
-          </a:p>
-        </p:txBody>
-      </p:sp>
+          <p:cNvPicPr>
+            <a:picLocks noChangeAspect="1"/>
+          </p:cNvPicPr>
+          <p:nvPr/>
+        </p:nvPicPr>
+        <p:blipFill>
+          <a:blip r:embed="rId2">
+            <a:extLst>
+              <a:ext uri="{28A0092B-C50C-407E-A947-70E740481C1C}">
+                <a14:useLocalDpi xmlns:a14="http://schemas.microsoft.com/office/drawing/2010/main" val="0"/>
+              </a:ext>
+            </a:extLst>
+          </a:blip>
+          <a:stretch>
+            <a:fillRect/>
+          </a:stretch>
+        </p:blipFill>
+        <p:spPr>
+          <a:xfrm>
+            <a:off x="238568" y="292100"/>
+            <a:ext cx="10934700" cy="6087567"/>
+          </a:xfrm>
+          <a:prstGeom prst="rect">
+            <a:avLst/>
+          </a:prstGeom>
+        </p:spPr>
+      </p:pic>
     </p:spTree>
     <p:extLst>
       <p:ext uri="{BB962C8B-B14F-4D97-AF65-F5344CB8AC3E}">
-        <p14:creationId xmlns:p14="http://schemas.microsoft.com/office/powerpoint/2010/main" val="2321027947"/>
+        <p14:creationId xmlns:p14="http://schemas.microsoft.com/office/powerpoint/2010/main" val="3807682051"/>
       </p:ext>
     </p:extLst>
   </p:cSld>

</xml_diff>

<commit_message>
Refactored touchPolling and updated/added diagrams
</commit_message>
<xml_diff>
--- a/Project/Presentation.pptx
+++ b/Project/Presentation.pptx
@@ -10,16 +10,16 @@
     <p:sldId id="258" r:id="rId4"/>
     <p:sldId id="263" r:id="rId5"/>
     <p:sldId id="262" r:id="rId6"/>
-    <p:sldId id="270" r:id="rId7"/>
-    <p:sldId id="268" r:id="rId8"/>
-    <p:sldId id="267" r:id="rId9"/>
-    <p:sldId id="266" r:id="rId10"/>
-    <p:sldId id="265" r:id="rId11"/>
-    <p:sldId id="269" r:id="rId12"/>
-    <p:sldId id="264" r:id="rId13"/>
-    <p:sldId id="261" r:id="rId14"/>
-    <p:sldId id="259" r:id="rId15"/>
-    <p:sldId id="260" r:id="rId16"/>
+    <p:sldId id="261" r:id="rId7"/>
+    <p:sldId id="259" r:id="rId8"/>
+    <p:sldId id="260" r:id="rId9"/>
+    <p:sldId id="271" r:id="rId10"/>
+    <p:sldId id="268" r:id="rId11"/>
+    <p:sldId id="267" r:id="rId12"/>
+    <p:sldId id="266" r:id="rId13"/>
+    <p:sldId id="264" r:id="rId14"/>
+    <p:sldId id="265" r:id="rId15"/>
+    <p:sldId id="269" r:id="rId16"/>
   </p:sldIdLst>
   <p:sldSz cx="12192000" cy="6858000"/>
   <p:notesSz cx="6858000" cy="9144000"/>
@@ -848,7 +848,7 @@
           <a:p>
             <a:fld id="{D8DCDA63-C378-4D8D-91ED-C6497C5896B9}" type="datetimeFigureOut">
               <a:rPr lang="en-US" smtClean="0"/>
-              <a:t>3/12/20</a:t>
+              <a:t>3/14/2020</a:t>
             </a:fld>
             <a:endParaRPr lang="en-US"/>
           </a:p>
@@ -1099,7 +1099,7 @@
           <a:p>
             <a:fld id="{D8DCDA63-C378-4D8D-91ED-C6497C5896B9}" type="datetimeFigureOut">
               <a:rPr lang="en-US" smtClean="0"/>
-              <a:t>3/12/20</a:t>
+              <a:t>3/14/2020</a:t>
             </a:fld>
             <a:endParaRPr lang="en-US"/>
           </a:p>
@@ -1413,7 +1413,7 @@
           <a:p>
             <a:fld id="{D8DCDA63-C378-4D8D-91ED-C6497C5896B9}" type="datetimeFigureOut">
               <a:rPr lang="en-US" smtClean="0"/>
-              <a:t>3/12/20</a:t>
+              <a:t>3/14/2020</a:t>
             </a:fld>
             <a:endParaRPr lang="en-US"/>
           </a:p>
@@ -1754,7 +1754,7 @@
           <a:p>
             <a:fld id="{D8DCDA63-C378-4D8D-91ED-C6497C5896B9}" type="datetimeFigureOut">
               <a:rPr lang="en-US" smtClean="0"/>
-              <a:t>3/12/20</a:t>
+              <a:t>3/14/2020</a:t>
             </a:fld>
             <a:endParaRPr lang="en-US"/>
           </a:p>
@@ -2068,7 +2068,7 @@
           <a:p>
             <a:fld id="{D8DCDA63-C378-4D8D-91ED-C6497C5896B9}" type="datetimeFigureOut">
               <a:rPr lang="en-US" smtClean="0"/>
-              <a:t>3/12/20</a:t>
+              <a:t>3/14/2020</a:t>
             </a:fld>
             <a:endParaRPr lang="en-US"/>
           </a:p>
@@ -2461,7 +2461,7 @@
           <a:p>
             <a:fld id="{D8DCDA63-C378-4D8D-91ED-C6497C5896B9}" type="datetimeFigureOut">
               <a:rPr lang="en-US" smtClean="0"/>
-              <a:t>3/12/20</a:t>
+              <a:t>3/14/2020</a:t>
             </a:fld>
             <a:endParaRPr lang="en-US"/>
           </a:p>
@@ -2631,7 +2631,7 @@
           <a:p>
             <a:fld id="{D8DCDA63-C378-4D8D-91ED-C6497C5896B9}" type="datetimeFigureOut">
               <a:rPr lang="en-US" smtClean="0"/>
-              <a:t>3/12/20</a:t>
+              <a:t>3/14/2020</a:t>
             </a:fld>
             <a:endParaRPr lang="en-US"/>
           </a:p>
@@ -2811,7 +2811,7 @@
           <a:p>
             <a:fld id="{D8DCDA63-C378-4D8D-91ED-C6497C5896B9}" type="datetimeFigureOut">
               <a:rPr lang="en-US" smtClean="0"/>
-              <a:t>3/12/20</a:t>
+              <a:t>3/14/2020</a:t>
             </a:fld>
             <a:endParaRPr lang="en-US"/>
           </a:p>
@@ -2987,7 +2987,7 @@
           <a:p>
             <a:fld id="{D8DCDA63-C378-4D8D-91ED-C6497C5896B9}" type="datetimeFigureOut">
               <a:rPr lang="en-US" smtClean="0"/>
-              <a:t>3/12/20</a:t>
+              <a:t>3/14/2020</a:t>
             </a:fld>
             <a:endParaRPr lang="en-US"/>
           </a:p>
@@ -3234,7 +3234,7 @@
           <a:p>
             <a:fld id="{D8DCDA63-C378-4D8D-91ED-C6497C5896B9}" type="datetimeFigureOut">
               <a:rPr lang="en-US" smtClean="0"/>
-              <a:t>3/12/20</a:t>
+              <a:t>3/14/2020</a:t>
             </a:fld>
             <a:endParaRPr lang="en-US"/>
           </a:p>
@@ -3466,7 +3466,7 @@
           <a:p>
             <a:fld id="{D8DCDA63-C378-4D8D-91ED-C6497C5896B9}" type="datetimeFigureOut">
               <a:rPr lang="en-US" smtClean="0"/>
-              <a:t>3/12/20</a:t>
+              <a:t>3/14/2020</a:t>
             </a:fld>
             <a:endParaRPr lang="en-US"/>
           </a:p>
@@ -3840,7 +3840,7 @@
           <a:p>
             <a:fld id="{D8DCDA63-C378-4D8D-91ED-C6497C5896B9}" type="datetimeFigureOut">
               <a:rPr lang="en-US" smtClean="0"/>
-              <a:t>3/12/20</a:t>
+              <a:t>3/14/2020</a:t>
             </a:fld>
             <a:endParaRPr lang="en-US"/>
           </a:p>
@@ -3963,7 +3963,7 @@
           <a:p>
             <a:fld id="{D8DCDA63-C378-4D8D-91ED-C6497C5896B9}" type="datetimeFigureOut">
               <a:rPr lang="en-US" smtClean="0"/>
-              <a:t>3/12/20</a:t>
+              <a:t>3/14/2020</a:t>
             </a:fld>
             <a:endParaRPr lang="en-US"/>
           </a:p>
@@ -4058,7 +4058,7 @@
           <a:p>
             <a:fld id="{D8DCDA63-C378-4D8D-91ED-C6497C5896B9}" type="datetimeFigureOut">
               <a:rPr lang="en-US" smtClean="0"/>
-              <a:t>3/12/20</a:t>
+              <a:t>3/14/2020</a:t>
             </a:fld>
             <a:endParaRPr lang="en-US"/>
           </a:p>
@@ -4313,7 +4313,7 @@
           <a:p>
             <a:fld id="{D8DCDA63-C378-4D8D-91ED-C6497C5896B9}" type="datetimeFigureOut">
               <a:rPr lang="en-US" smtClean="0"/>
-              <a:t>3/12/20</a:t>
+              <a:t>3/14/2020</a:t>
             </a:fld>
             <a:endParaRPr lang="en-US"/>
           </a:p>
@@ -4576,7 +4576,7 @@
           <a:p>
             <a:fld id="{D8DCDA63-C378-4D8D-91ED-C6497C5896B9}" type="datetimeFigureOut">
               <a:rPr lang="en-US" smtClean="0"/>
-              <a:t>3/12/20</a:t>
+              <a:t>3/14/2020</a:t>
             </a:fld>
             <a:endParaRPr lang="en-US"/>
           </a:p>
@@ -5319,7 +5319,7 @@
           <a:p>
             <a:fld id="{D8DCDA63-C378-4D8D-91ED-C6497C5896B9}" type="datetimeFigureOut">
               <a:rPr lang="en-US" smtClean="0"/>
-              <a:t>3/12/20</a:t>
+              <a:t>3/14/2020</a:t>
             </a:fld>
             <a:endParaRPr lang="en-US"/>
           </a:p>
@@ -5976,7 +5976,7 @@
           <p:cNvPr id="2" name="Title 1">
             <a:extLst>
               <a:ext uri="{FF2B5EF4-FFF2-40B4-BE49-F238E27FC236}">
-                <a16:creationId xmlns:a16="http://schemas.microsoft.com/office/drawing/2014/main" id="{719F676C-7126-4B32-9864-ABD450F3B082}"/>
+                <a16:creationId xmlns:a16="http://schemas.microsoft.com/office/drawing/2014/main" id="{AD0C1C72-DE63-42D5-A290-281E255E5C8B}"/>
               </a:ext>
             </a:extLst>
           </p:cNvPr>
@@ -5989,8 +5989,8 @@
         </p:nvSpPr>
         <p:spPr>
           <a:xfrm>
-            <a:off x="6189134" y="0"/>
-            <a:ext cx="3361266" cy="1320800"/>
+            <a:off x="5649384" y="0"/>
+            <a:ext cx="3675591" cy="1320800"/>
           </a:xfrm>
         </p:spPr>
         <p:txBody>
@@ -5999,7 +5999,7 @@
           <a:p>
             <a:r>
               <a:rPr lang="en-US" dirty="0" err="1"/>
-              <a:t>StreamingTask</a:t>
+              <a:t>InitializationTask</a:t>
             </a:r>
             <a:endParaRPr lang="en-US" dirty="0"/>
           </a:p>
@@ -6007,10 +6007,10 @@
       </p:sp>
       <p:pic>
         <p:nvPicPr>
-          <p:cNvPr id="5" name="Picture 4" descr="A picture containing parking, meter, street, black&#10;&#10;Description automatically generated">
+          <p:cNvPr id="5" name="Picture 4" descr="A screenshot of a cell phone&#10;&#10;Description automatically generated">
             <a:extLst>
               <a:ext uri="{FF2B5EF4-FFF2-40B4-BE49-F238E27FC236}">
-                <a16:creationId xmlns:a16="http://schemas.microsoft.com/office/drawing/2014/main" id="{15BB4708-C476-4208-9137-C4C9C51DD6BC}"/>
+                <a16:creationId xmlns:a16="http://schemas.microsoft.com/office/drawing/2014/main" id="{876F7E46-1088-400C-9742-865C1A8994F1}"/>
               </a:ext>
             </a:extLst>
           </p:cNvPr>
@@ -6033,8 +6033,8 @@
         </p:blipFill>
         <p:spPr>
           <a:xfrm>
-            <a:off x="303545" y="133350"/>
-            <a:ext cx="10353195" cy="6591300"/>
+            <a:off x="391584" y="660400"/>
+            <a:ext cx="9723532" cy="5777850"/>
           </a:xfrm>
           <a:prstGeom prst="rect">
             <a:avLst/>
@@ -6044,7 +6044,7 @@
     </p:spTree>
     <p:extLst>
       <p:ext uri="{BB962C8B-B14F-4D97-AF65-F5344CB8AC3E}">
-        <p14:creationId xmlns:p14="http://schemas.microsoft.com/office/powerpoint/2010/main" val="3342836531"/>
+        <p14:creationId xmlns:p14="http://schemas.microsoft.com/office/powerpoint/2010/main" val="2321027947"/>
       </p:ext>
     </p:extLst>
   </p:cSld>
@@ -6076,7 +6076,7 @@
           <p:cNvPr id="2" name="Title 1">
             <a:extLst>
               <a:ext uri="{FF2B5EF4-FFF2-40B4-BE49-F238E27FC236}">
-                <a16:creationId xmlns:a16="http://schemas.microsoft.com/office/drawing/2014/main" id="{66543A97-4A68-1C46-ACB8-35A2A127D92D}"/>
+                <a16:creationId xmlns:a16="http://schemas.microsoft.com/office/drawing/2014/main" id="{D4852A90-2B00-40CD-8D60-E12CC3A01DF5}"/>
               </a:ext>
             </a:extLst>
           </p:cNvPr>
@@ -6089,8 +6089,8 @@
         </p:nvSpPr>
         <p:spPr>
           <a:xfrm>
-            <a:off x="5700889" y="0"/>
-            <a:ext cx="3860799" cy="654756"/>
+            <a:off x="5743335" y="0"/>
+            <a:ext cx="3685116" cy="790575"/>
           </a:xfrm>
         </p:spPr>
         <p:txBody>
@@ -6098,18 +6098,19 @@
           <a:lstStyle/>
           <a:p>
             <a:r>
-              <a:rPr lang="en-US" dirty="0"/>
-              <a:t>Mp3StreamSDFile</a:t>
-            </a:r>
+              <a:rPr lang="en-US" dirty="0" err="1"/>
+              <a:t>TouchPollingTask</a:t>
+            </a:r>
+            <a:endParaRPr lang="en-US" dirty="0"/>
           </a:p>
         </p:txBody>
       </p:sp>
       <p:pic>
         <p:nvPicPr>
-          <p:cNvPr id="5" name="Picture 4">
+          <p:cNvPr id="7" name="Picture 6" descr="A screenshot of a cell phone&#10;&#10;Description automatically generated">
             <a:extLst>
               <a:ext uri="{FF2B5EF4-FFF2-40B4-BE49-F238E27FC236}">
-                <a16:creationId xmlns:a16="http://schemas.microsoft.com/office/drawing/2014/main" id="{46DB8857-29B7-9A48-AD36-4F9874D8A186}"/>
+                <a16:creationId xmlns:a16="http://schemas.microsoft.com/office/drawing/2014/main" id="{AABA1997-AF81-4E2B-8A8A-3E0847EAA46A}"/>
               </a:ext>
             </a:extLst>
           </p:cNvPr>
@@ -6132,8 +6133,8 @@
         </p:blipFill>
         <p:spPr>
           <a:xfrm>
-            <a:off x="0" y="120650"/>
-            <a:ext cx="10299700" cy="6616700"/>
+            <a:off x="517237" y="270163"/>
+            <a:ext cx="8423564" cy="6317673"/>
           </a:xfrm>
           <a:prstGeom prst="rect">
             <a:avLst/>
@@ -6143,7 +6144,7 @@
     </p:spTree>
     <p:extLst>
       <p:ext uri="{BB962C8B-B14F-4D97-AF65-F5344CB8AC3E}">
-        <p14:creationId xmlns:p14="http://schemas.microsoft.com/office/powerpoint/2010/main" val="763050812"/>
+        <p14:creationId xmlns:p14="http://schemas.microsoft.com/office/powerpoint/2010/main" val="1763416746"/>
       </p:ext>
     </p:extLst>
   </p:cSld>
@@ -6175,7 +6176,7 @@
           <p:cNvPr id="2" name="Title 1">
             <a:extLst>
               <a:ext uri="{FF2B5EF4-FFF2-40B4-BE49-F238E27FC236}">
-                <a16:creationId xmlns:a16="http://schemas.microsoft.com/office/drawing/2014/main" id="{5DFD14A1-05BC-47C9-9C60-EF080006C2A0}"/>
+                <a16:creationId xmlns:a16="http://schemas.microsoft.com/office/drawing/2014/main" id="{75EDB837-B10F-4AED-B6CA-2355EB8FDEA3}"/>
               </a:ext>
             </a:extLst>
           </p:cNvPr>
@@ -6188,8 +6189,8 @@
         </p:nvSpPr>
         <p:spPr>
           <a:xfrm>
-            <a:off x="2297290" y="0"/>
-            <a:ext cx="3627966" cy="733778"/>
+            <a:off x="4550218" y="0"/>
+            <a:ext cx="4897966" cy="1320800"/>
           </a:xfrm>
         </p:spPr>
         <p:txBody>
@@ -6198,7 +6199,7 @@
           <a:p>
             <a:r>
               <a:rPr lang="en-US" dirty="0" err="1"/>
-              <a:t>LcdHandlerTask</a:t>
+              <a:t>CommandHandlerTask</a:t>
             </a:r>
             <a:endParaRPr lang="en-US" dirty="0"/>
           </a:p>
@@ -6206,10 +6207,10 @@
       </p:sp>
       <p:pic>
         <p:nvPicPr>
-          <p:cNvPr id="5" name="Picture 4" descr="A picture containing computer&#10;&#10;Description automatically generated">
+          <p:cNvPr id="7" name="Picture 6" descr="A picture containing computer&#10;&#10;Description automatically generated">
             <a:extLst>
               <a:ext uri="{FF2B5EF4-FFF2-40B4-BE49-F238E27FC236}">
-                <a16:creationId xmlns:a16="http://schemas.microsoft.com/office/drawing/2014/main" id="{78F9331A-28F8-4116-9176-74A3C236D452}"/>
+                <a16:creationId xmlns:a16="http://schemas.microsoft.com/office/drawing/2014/main" id="{EF256FAD-F262-4ABB-AD4A-9AF9A334E917}"/>
               </a:ext>
             </a:extLst>
           </p:cNvPr>
@@ -6232,8 +6233,8 @@
         </p:blipFill>
         <p:spPr>
           <a:xfrm>
-            <a:off x="142022" y="499190"/>
-            <a:ext cx="10060811" cy="6358810"/>
+            <a:off x="628073" y="660400"/>
+            <a:ext cx="10684641" cy="5952024"/>
           </a:xfrm>
           <a:prstGeom prst="rect">
             <a:avLst/>
@@ -6243,7 +6244,7 @@
     </p:spTree>
     <p:extLst>
       <p:ext uri="{BB962C8B-B14F-4D97-AF65-F5344CB8AC3E}">
-        <p14:creationId xmlns:p14="http://schemas.microsoft.com/office/powerpoint/2010/main" val="2106166478"/>
+        <p14:creationId xmlns:p14="http://schemas.microsoft.com/office/powerpoint/2010/main" val="3807682051"/>
       </p:ext>
     </p:extLst>
   </p:cSld>
@@ -6275,7 +6276,7 @@
           <p:cNvPr id="2" name="Title 1">
             <a:extLst>
               <a:ext uri="{FF2B5EF4-FFF2-40B4-BE49-F238E27FC236}">
-                <a16:creationId xmlns:a16="http://schemas.microsoft.com/office/drawing/2014/main" id="{B1E49FBD-575A-4340-A474-5D5E7E5142CB}"/>
+                <a16:creationId xmlns:a16="http://schemas.microsoft.com/office/drawing/2014/main" id="{5DFD14A1-05BC-47C9-9C60-EF080006C2A0}"/>
               </a:ext>
             </a:extLst>
           </p:cNvPr>
@@ -6286,59 +6287,64 @@
             <p:ph type="title"/>
           </p:nvPr>
         </p:nvSpPr>
-        <p:spPr/>
+        <p:spPr>
+          <a:xfrm>
+            <a:off x="5890235" y="0"/>
+            <a:ext cx="3627966" cy="733778"/>
+          </a:xfrm>
+        </p:spPr>
         <p:txBody>
           <a:bodyPr/>
           <a:lstStyle/>
           <a:p>
-            <a:pPr algn="ctr"/>
-            <a:r>
-              <a:rPr lang="en-US" dirty="0"/>
-              <a:t>Running the System</a:t>
-            </a:r>
-          </a:p>
-        </p:txBody>
-      </p:sp>
-      <p:sp>
-        <p:nvSpPr>
-          <p:cNvPr id="3" name="Content Placeholder 2">
+            <a:r>
+              <a:rPr lang="en-US" dirty="0" err="1"/>
+              <a:t>LcdHandlerTask</a:t>
+            </a:r>
+            <a:endParaRPr lang="en-US" dirty="0"/>
+          </a:p>
+        </p:txBody>
+      </p:sp>
+      <p:pic>
+        <p:nvPicPr>
+          <p:cNvPr id="4" name="Picture 3" descr="A picture containing computer&#10;&#10;Description automatically generated">
             <a:extLst>
               <a:ext uri="{FF2B5EF4-FFF2-40B4-BE49-F238E27FC236}">
-                <a16:creationId xmlns:a16="http://schemas.microsoft.com/office/drawing/2014/main" id="{54B314DA-9C36-4234-89B4-326076874AE0}"/>
+                <a16:creationId xmlns:a16="http://schemas.microsoft.com/office/drawing/2014/main" id="{3CFB2FE2-C8C7-4F78-868B-68FCFA37FA09}"/>
               </a:ext>
             </a:extLst>
           </p:cNvPr>
-          <p:cNvSpPr>
-            <a:spLocks noGrp="1"/>
-          </p:cNvSpPr>
-          <p:nvPr>
-            <p:ph idx="1"/>
-          </p:nvPr>
-        </p:nvSpPr>
-        <p:spPr/>
-        <p:txBody>
-          <a:bodyPr>
-            <a:normAutofit/>
-          </a:bodyPr>
-          <a:lstStyle/>
-          <a:p>
-            <a:r>
-              <a:rPr lang="en-US" sz="2800" dirty="0"/>
-              <a:t>Generate the song list</a:t>
-            </a:r>
-          </a:p>
-          <a:p>
-            <a:r>
-              <a:rPr lang="en-US" sz="2800" dirty="0"/>
-              <a:t>Controls Layout</a:t>
-            </a:r>
-          </a:p>
-        </p:txBody>
-      </p:sp>
+          <p:cNvPicPr>
+            <a:picLocks noChangeAspect="1"/>
+          </p:cNvPicPr>
+          <p:nvPr/>
+        </p:nvPicPr>
+        <p:blipFill>
+          <a:blip r:embed="rId2">
+            <a:extLst>
+              <a:ext uri="{28A0092B-C50C-407E-A947-70E740481C1C}">
+                <a14:useLocalDpi xmlns:a14="http://schemas.microsoft.com/office/drawing/2010/main" val="0"/>
+              </a:ext>
+            </a:extLst>
+          </a:blip>
+          <a:stretch>
+            <a:fillRect/>
+          </a:stretch>
+        </p:blipFill>
+        <p:spPr>
+          <a:xfrm>
+            <a:off x="212867" y="163689"/>
+            <a:ext cx="8533969" cy="6371760"/>
+          </a:xfrm>
+          <a:prstGeom prst="rect">
+            <a:avLst/>
+          </a:prstGeom>
+        </p:spPr>
+      </p:pic>
     </p:spTree>
     <p:extLst>
       <p:ext uri="{BB962C8B-B14F-4D97-AF65-F5344CB8AC3E}">
-        <p14:creationId xmlns:p14="http://schemas.microsoft.com/office/powerpoint/2010/main" val="3056241565"/>
+        <p14:creationId xmlns:p14="http://schemas.microsoft.com/office/powerpoint/2010/main" val="2106166478"/>
       </p:ext>
     </p:extLst>
   </p:cSld>
@@ -6370,7 +6376,7 @@
           <p:cNvPr id="2" name="Title 1">
             <a:extLst>
               <a:ext uri="{FF2B5EF4-FFF2-40B4-BE49-F238E27FC236}">
-                <a16:creationId xmlns:a16="http://schemas.microsoft.com/office/drawing/2014/main" id="{B5549C2F-0287-447D-89A6-58770AA23159}"/>
+                <a16:creationId xmlns:a16="http://schemas.microsoft.com/office/drawing/2014/main" id="{719F676C-7126-4B32-9864-ABD450F3B082}"/>
               </a:ext>
             </a:extLst>
           </p:cNvPr>
@@ -6381,158 +6387,64 @@
             <p:ph type="title"/>
           </p:nvPr>
         </p:nvSpPr>
-        <p:spPr/>
+        <p:spPr>
+          <a:xfrm>
+            <a:off x="6189134" y="0"/>
+            <a:ext cx="3361266" cy="1320800"/>
+          </a:xfrm>
+        </p:spPr>
         <p:txBody>
           <a:bodyPr/>
           <a:lstStyle/>
           <a:p>
-            <a:pPr algn="ctr"/>
-            <a:r>
-              <a:rPr lang="en-US" dirty="0"/>
-              <a:t>Generate Song List</a:t>
-            </a:r>
-          </a:p>
-        </p:txBody>
-      </p:sp>
-      <p:sp>
-        <p:nvSpPr>
-          <p:cNvPr id="3" name="Content Placeholder 2">
+            <a:r>
+              <a:rPr lang="en-US" dirty="0" err="1"/>
+              <a:t>StreamingTask</a:t>
+            </a:r>
+            <a:endParaRPr lang="en-US" dirty="0"/>
+          </a:p>
+        </p:txBody>
+      </p:sp>
+      <p:pic>
+        <p:nvPicPr>
+          <p:cNvPr id="4" name="Picture 3" descr="A picture containing parking, meter, street, black&#10;&#10;Description automatically generated">
             <a:extLst>
               <a:ext uri="{FF2B5EF4-FFF2-40B4-BE49-F238E27FC236}">
-                <a16:creationId xmlns:a16="http://schemas.microsoft.com/office/drawing/2014/main" id="{DE9842A4-1CA9-4F3C-AE83-4C68688AB3D3}"/>
+                <a16:creationId xmlns:a16="http://schemas.microsoft.com/office/drawing/2014/main" id="{9DCCE76B-D466-4A9C-A960-B4B7BE2E382B}"/>
               </a:ext>
             </a:extLst>
           </p:cNvPr>
-          <p:cNvSpPr>
-            <a:spLocks noGrp="1"/>
-          </p:cNvSpPr>
-          <p:nvPr>
-            <p:ph idx="1"/>
-          </p:nvPr>
-        </p:nvSpPr>
-        <p:spPr/>
-        <p:txBody>
-          <a:bodyPr>
-            <a:normAutofit lnSpcReduction="10000"/>
-          </a:bodyPr>
-          <a:lstStyle/>
-          <a:p>
-            <a:r>
-              <a:rPr lang="en-US" dirty="0"/>
-              <a:t>Create a folder in the user’s </a:t>
-            </a:r>
-            <a:r>
-              <a:rPr lang="en-US" i="1" dirty="0"/>
-              <a:t>Music</a:t>
-            </a:r>
-            <a:r>
-              <a:rPr lang="en-US" dirty="0"/>
-              <a:t> directory called </a:t>
-            </a:r>
-            <a:r>
-              <a:rPr lang="en-US" b="1" dirty="0" err="1"/>
-              <a:t>to_SD</a:t>
-            </a:r>
-            <a:r>
-              <a:rPr lang="en-US" b="1" dirty="0"/>
-              <a:t>.</a:t>
-            </a:r>
-          </a:p>
-          <a:p>
-            <a:r>
-              <a:rPr lang="en-US" dirty="0"/>
-              <a:t>Copy desired .mp3/.m4a files into </a:t>
-            </a:r>
-            <a:r>
-              <a:rPr lang="en-US" b="1" dirty="0" err="1"/>
-              <a:t>to_SD</a:t>
-            </a:r>
-            <a:r>
-              <a:rPr lang="en-US" dirty="0"/>
-              <a:t>.</a:t>
-            </a:r>
-          </a:p>
-          <a:p>
-            <a:r>
-              <a:rPr lang="en-US" dirty="0"/>
-              <a:t>In the embsys105/Project directory, run the </a:t>
-            </a:r>
-            <a:r>
-              <a:rPr lang="en-US" b="1" dirty="0"/>
-              <a:t>generateSongList.py</a:t>
-            </a:r>
-            <a:r>
-              <a:rPr lang="en-US" dirty="0"/>
-              <a:t> python script.</a:t>
-            </a:r>
-          </a:p>
-          <a:p>
-            <a:pPr lvl="1"/>
-            <a:r>
-              <a:rPr lang="en-US" dirty="0"/>
-              <a:t>Renames files so they can be read within the MP3 Player application.</a:t>
-            </a:r>
-          </a:p>
-          <a:p>
-            <a:pPr lvl="1"/>
-            <a:r>
-              <a:rPr lang="en-US" dirty="0"/>
-              <a:t>Creates a file, songs.txt, that is read by the MP3 Player application to populate a list of track information nodes.</a:t>
-            </a:r>
-          </a:p>
-          <a:p>
-            <a:pPr lvl="1"/>
-            <a:r>
-              <a:rPr lang="en-US" dirty="0"/>
-              <a:t>Line format within </a:t>
-            </a:r>
-            <a:r>
-              <a:rPr lang="en-US" b="1" dirty="0" err="1"/>
-              <a:t>songs.</a:t>
-            </a:r>
-            <a:r>
-              <a:rPr lang="en-US" dirty="0" err="1"/>
-              <a:t>txt</a:t>
-            </a:r>
-            <a:r>
-              <a:rPr lang="en-US" dirty="0"/>
-              <a:t> (for .mp3 files):</a:t>
-            </a:r>
-          </a:p>
-          <a:p>
-            <a:pPr lvl="2"/>
-            <a:r>
-              <a:rPr lang="en-US" dirty="0"/>
-              <a:t>“track&lt;file number&gt;.mp3, &lt;song name&gt;.mp3”</a:t>
-            </a:r>
-          </a:p>
-          <a:p>
-            <a:pPr lvl="2"/>
-            <a:r>
-              <a:rPr lang="en-US" dirty="0"/>
-              <a:t>Ex: track004.mp3, Involuntary Doppelganger.mp3</a:t>
-            </a:r>
-          </a:p>
-          <a:p>
-            <a:r>
-              <a:rPr lang="en-US" dirty="0"/>
-              <a:t>Copy the contents of the </a:t>
-            </a:r>
-            <a:r>
-              <a:rPr lang="en-US" b="1" dirty="0" err="1"/>
-              <a:t>to_SD</a:t>
-            </a:r>
-            <a:r>
-              <a:rPr lang="en-US" dirty="0"/>
-              <a:t> directory into the root directory of the SD card.</a:t>
-            </a:r>
-          </a:p>
-        </p:txBody>
-      </p:sp>
+          <p:cNvPicPr>
+            <a:picLocks noChangeAspect="1"/>
+          </p:cNvPicPr>
+          <p:nvPr/>
+        </p:nvPicPr>
+        <p:blipFill>
+          <a:blip r:embed="rId2">
+            <a:extLst>
+              <a:ext uri="{28A0092B-C50C-407E-A947-70E740481C1C}">
+                <a14:useLocalDpi xmlns:a14="http://schemas.microsoft.com/office/drawing/2010/main" val="0"/>
+              </a:ext>
+            </a:extLst>
+          </a:blip>
+          <a:stretch>
+            <a:fillRect/>
+          </a:stretch>
+        </p:blipFill>
+        <p:spPr>
+          <a:xfrm>
+            <a:off x="192708" y="286327"/>
+            <a:ext cx="9872620" cy="6285345"/>
+          </a:xfrm>
+          <a:prstGeom prst="rect">
+            <a:avLst/>
+          </a:prstGeom>
+        </p:spPr>
+      </p:pic>
     </p:spTree>
     <p:extLst>
       <p:ext uri="{BB962C8B-B14F-4D97-AF65-F5344CB8AC3E}">
-        <p14:creationId xmlns:p14="http://schemas.microsoft.com/office/powerpoint/2010/main" val="1915672440"/>
+        <p14:creationId xmlns:p14="http://schemas.microsoft.com/office/powerpoint/2010/main" val="3342836531"/>
       </p:ext>
     </p:extLst>
   </p:cSld>
@@ -6564,7 +6476,7 @@
           <p:cNvPr id="2" name="Title 1">
             <a:extLst>
               <a:ext uri="{FF2B5EF4-FFF2-40B4-BE49-F238E27FC236}">
-                <a16:creationId xmlns:a16="http://schemas.microsoft.com/office/drawing/2014/main" id="{F063DFEB-1141-4B14-A7AE-D34FFE996479}"/>
+                <a16:creationId xmlns:a16="http://schemas.microsoft.com/office/drawing/2014/main" id="{66543A97-4A68-1C46-ACB8-35A2A127D92D}"/>
               </a:ext>
             </a:extLst>
           </p:cNvPr>
@@ -6575,25 +6487,29 @@
             <p:ph type="title"/>
           </p:nvPr>
         </p:nvSpPr>
-        <p:spPr/>
+        <p:spPr>
+          <a:xfrm>
+            <a:off x="5700889" y="0"/>
+            <a:ext cx="3860799" cy="654756"/>
+          </a:xfrm>
+        </p:spPr>
         <p:txBody>
           <a:bodyPr/>
           <a:lstStyle/>
           <a:p>
-            <a:pPr algn="ctr"/>
             <a:r>
               <a:rPr lang="en-US" dirty="0"/>
-              <a:t>Controls Layout</a:t>
+              <a:t>Mp3StreamSDFile</a:t>
             </a:r>
           </a:p>
         </p:txBody>
       </p:sp>
       <p:pic>
         <p:nvPicPr>
-          <p:cNvPr id="5" name="Picture 4" descr="A screenshot of a cell phone&#10;&#10;Description automatically generated">
+          <p:cNvPr id="4" name="Picture 3" descr="A screenshot of a computer&#10;&#10;Description automatically generated">
             <a:extLst>
               <a:ext uri="{FF2B5EF4-FFF2-40B4-BE49-F238E27FC236}">
-                <a16:creationId xmlns:a16="http://schemas.microsoft.com/office/drawing/2014/main" id="{E0AA0076-DB6A-4712-84D3-86A8CECDB5B9}"/>
+                <a16:creationId xmlns:a16="http://schemas.microsoft.com/office/drawing/2014/main" id="{643DA47F-B950-4633-9089-26045A1C9845}"/>
               </a:ext>
             </a:extLst>
           </p:cNvPr>
@@ -6616,8 +6532,8 @@
         </p:blipFill>
         <p:spPr>
           <a:xfrm>
-            <a:off x="677334" y="1930400"/>
-            <a:ext cx="10039350" cy="3762375"/>
+            <a:off x="403242" y="572655"/>
+            <a:ext cx="9774525" cy="6285345"/>
           </a:xfrm>
           <a:prstGeom prst="rect">
             <a:avLst/>
@@ -6627,7 +6543,7 @@
     </p:spTree>
     <p:extLst>
       <p:ext uri="{BB962C8B-B14F-4D97-AF65-F5344CB8AC3E}">
-        <p14:creationId xmlns:p14="http://schemas.microsoft.com/office/powerpoint/2010/main" val="1239112764"/>
+        <p14:creationId xmlns:p14="http://schemas.microsoft.com/office/powerpoint/2010/main" val="763050812"/>
       </p:ext>
     </p:extLst>
   </p:cSld>
@@ -7124,7 +7040,7 @@
           <p:cNvPr id="2" name="Title 1">
             <a:extLst>
               <a:ext uri="{FF2B5EF4-FFF2-40B4-BE49-F238E27FC236}">
-                <a16:creationId xmlns:a16="http://schemas.microsoft.com/office/drawing/2014/main" id="{58124E1A-74C3-3342-A71A-3A4A723BAAAA}"/>
+                <a16:creationId xmlns:a16="http://schemas.microsoft.com/office/drawing/2014/main" id="{B1E49FBD-575A-4340-A474-5D5E7E5142CB}"/>
               </a:ext>
             </a:extLst>
           </p:cNvPr>
@@ -7137,13 +7053,13 @@
         </p:nvSpPr>
         <p:spPr/>
         <p:txBody>
-          <a:bodyPr vert="horz" anchor="ctr"/>
+          <a:bodyPr/>
           <a:lstStyle/>
           <a:p>
             <a:pPr algn="ctr"/>
             <a:r>
               <a:rPr lang="en-US" dirty="0"/>
-              <a:t>Details</a:t>
+              <a:t>Running the System</a:t>
             </a:r>
           </a:p>
         </p:txBody>
@@ -7153,7 +7069,7 @@
           <p:cNvPr id="3" name="Content Placeholder 2">
             <a:extLst>
               <a:ext uri="{FF2B5EF4-FFF2-40B4-BE49-F238E27FC236}">
-                <a16:creationId xmlns:a16="http://schemas.microsoft.com/office/drawing/2014/main" id="{BDEDB17D-810D-C847-AE01-CCB008A13219}"/>
+                <a16:creationId xmlns:a16="http://schemas.microsoft.com/office/drawing/2014/main" id="{54B314DA-9C36-4234-89B4-326076874AE0}"/>
               </a:ext>
             </a:extLst>
           </p:cNvPr>
@@ -7167,137 +7083,19 @@
         <p:spPr/>
         <p:txBody>
           <a:bodyPr>
-            <a:normAutofit fontScale="92500" lnSpcReduction="10000"/>
+            <a:normAutofit/>
           </a:bodyPr>
           <a:lstStyle/>
           <a:p>
             <a:r>
-              <a:rPr lang="en-US" dirty="0" err="1"/>
-              <a:t>InitializationTask</a:t>
-            </a:r>
-            <a:r>
-              <a:rPr lang="en-US" dirty="0"/>
-              <a:t>() synchronizes on tasks being initialized; prevents </a:t>
-            </a:r>
-            <a:r>
-              <a:rPr lang="en-US" dirty="0" err="1"/>
-              <a:t>TouchPollingTask</a:t>
-            </a:r>
-            <a:r>
-              <a:rPr lang="en-US" dirty="0"/>
-              <a:t>() and </a:t>
-            </a:r>
-            <a:r>
-              <a:rPr lang="en-US" dirty="0" err="1"/>
-              <a:t>LcdHandlerTask</a:t>
-            </a:r>
-            <a:r>
-              <a:rPr lang="en-US" dirty="0"/>
-              <a:t>() from starting if a task encounters an error before fully initializing.</a:t>
-            </a:r>
-          </a:p>
-          <a:p>
-            <a:r>
-              <a:rPr lang="en-US" dirty="0" err="1"/>
-              <a:t>TouchPollingTask</a:t>
-            </a:r>
-            <a:r>
-              <a:rPr lang="en-US" dirty="0"/>
-              <a:t>() sends only a single message when a button is pressed; 3 exceptions: holding play/skip/restart buttons have additional functionality.</a:t>
-            </a:r>
-          </a:p>
-          <a:p>
-            <a:r>
-              <a:rPr lang="en-US" dirty="0" err="1"/>
-              <a:t>CommandHandlerTask</a:t>
-            </a:r>
-            <a:r>
-              <a:rPr lang="en-US" dirty="0"/>
-              <a:t>() pends on the message received from </a:t>
-            </a:r>
-            <a:r>
-              <a:rPr lang="en-US" dirty="0" err="1"/>
-              <a:t>TouchPollingTask</a:t>
-            </a:r>
-            <a:r>
-              <a:rPr lang="en-US" dirty="0"/>
-              <a:t>() and then sends messages to </a:t>
-            </a:r>
-            <a:r>
-              <a:rPr lang="en-US" dirty="0" err="1"/>
-              <a:t>StreamingTask</a:t>
-            </a:r>
-            <a:r>
-              <a:rPr lang="en-US" dirty="0"/>
-              <a:t>() and </a:t>
-            </a:r>
-            <a:r>
-              <a:rPr lang="en-US" dirty="0" err="1"/>
-              <a:t>LcdHandlerTask</a:t>
-            </a:r>
-            <a:r>
-              <a:rPr lang="en-US" dirty="0"/>
-              <a:t>().</a:t>
-            </a:r>
-          </a:p>
-          <a:p>
-            <a:r>
-              <a:rPr lang="en-US" dirty="0" err="1"/>
-              <a:t>StreamingTask</a:t>
-            </a:r>
-            <a:r>
-              <a:rPr lang="en-US" dirty="0"/>
-              <a:t>() polls for the play/skip/restart commands; Mp3StreamSDFile() within the task polls for play/stop/pause/skip/restart/fast forward/rewind/volume up/volume down commands.  Sends track name and song progress to </a:t>
-            </a:r>
-            <a:r>
-              <a:rPr lang="en-US" dirty="0" err="1"/>
-              <a:t>LcdHandlerTask</a:t>
-            </a:r>
-            <a:r>
-              <a:rPr lang="en-US" dirty="0"/>
-              <a:t>().</a:t>
-            </a:r>
-          </a:p>
-          <a:p>
-            <a:r>
-              <a:rPr lang="en-US" dirty="0" err="1"/>
-              <a:t>LcdHandlerTask</a:t>
-            </a:r>
-            <a:r>
-              <a:rPr lang="en-US" dirty="0"/>
-              <a:t>() polls for 4 </a:t>
-            </a:r>
-            <a:r>
-              <a:rPr lang="en-US"/>
-              <a:t>different messages for </a:t>
-            </a:r>
-            <a:r>
-              <a:rPr lang="en-US" dirty="0"/>
-              <a:t>updating the GUI: 1 from </a:t>
-            </a:r>
-            <a:r>
-              <a:rPr lang="en-US" dirty="0" err="1"/>
-              <a:t>TouchPollingTask</a:t>
-            </a:r>
-            <a:r>
-              <a:rPr lang="en-US" dirty="0"/>
-              <a:t>(), 1 from </a:t>
-            </a:r>
-            <a:r>
-              <a:rPr lang="en-US" dirty="0" err="1"/>
-              <a:t>CommandHandlerTask</a:t>
-            </a:r>
-            <a:r>
-              <a:rPr lang="en-US" dirty="0"/>
-              <a:t>(), and 2 from </a:t>
-            </a:r>
-            <a:r>
-              <a:rPr lang="en-US" dirty="0" err="1"/>
-              <a:t>StreamingTask</a:t>
-            </a:r>
-            <a:r>
-              <a:rPr lang="en-US" dirty="0"/>
-              <a:t>().</a:t>
+              <a:rPr lang="en-US" sz="2800" dirty="0"/>
+              <a:t>Generate the song list</a:t>
+            </a:r>
+          </a:p>
+          <a:p>
+            <a:r>
+              <a:rPr lang="en-US" sz="2800" dirty="0"/>
+              <a:t>Controls Layout</a:t>
             </a:r>
           </a:p>
         </p:txBody>
@@ -7305,7 +7103,7 @@
     </p:spTree>
     <p:extLst>
       <p:ext uri="{BB962C8B-B14F-4D97-AF65-F5344CB8AC3E}">
-        <p14:creationId xmlns:p14="http://schemas.microsoft.com/office/powerpoint/2010/main" val="2545223388"/>
+        <p14:creationId xmlns:p14="http://schemas.microsoft.com/office/powerpoint/2010/main" val="3056241565"/>
       </p:ext>
     </p:extLst>
   </p:cSld>
@@ -7337,7 +7135,7 @@
           <p:cNvPr id="2" name="Title 1">
             <a:extLst>
               <a:ext uri="{FF2B5EF4-FFF2-40B4-BE49-F238E27FC236}">
-                <a16:creationId xmlns:a16="http://schemas.microsoft.com/office/drawing/2014/main" id="{AD0C1C72-DE63-42D5-A290-281E255E5C8B}"/>
+                <a16:creationId xmlns:a16="http://schemas.microsoft.com/office/drawing/2014/main" id="{B5549C2F-0287-447D-89A6-58770AA23159}"/>
               </a:ext>
             </a:extLst>
           </p:cNvPr>
@@ -7353,11 +7151,11 @@
           <a:bodyPr/>
           <a:lstStyle/>
           <a:p>
-            <a:r>
-              <a:rPr lang="en-US" dirty="0" err="1"/>
-              <a:t>InitializationTask</a:t>
-            </a:r>
-            <a:endParaRPr lang="en-US" dirty="0"/>
+            <a:pPr algn="ctr"/>
+            <a:r>
+              <a:rPr lang="en-US" dirty="0"/>
+              <a:t>Generate Song List</a:t>
+            </a:r>
           </a:p>
         </p:txBody>
       </p:sp>
@@ -7366,7 +7164,7 @@
           <p:cNvPr id="3" name="Content Placeholder 2">
             <a:extLst>
               <a:ext uri="{FF2B5EF4-FFF2-40B4-BE49-F238E27FC236}">
-                <a16:creationId xmlns:a16="http://schemas.microsoft.com/office/drawing/2014/main" id="{F1482B70-E152-43F2-A15C-97E40B6AC719}"/>
+                <a16:creationId xmlns:a16="http://schemas.microsoft.com/office/drawing/2014/main" id="{DE9842A4-1CA9-4F3C-AE83-4C68688AB3D3}"/>
               </a:ext>
             </a:extLst>
           </p:cNvPr>
@@ -7379,17 +7177,127 @@
         </p:nvSpPr>
         <p:spPr/>
         <p:txBody>
-          <a:bodyPr/>
-          <a:lstStyle/>
-          <a:p>
-            <a:endParaRPr lang="en-US"/>
+          <a:bodyPr>
+            <a:normAutofit lnSpcReduction="10000"/>
+          </a:bodyPr>
+          <a:lstStyle/>
+          <a:p>
+            <a:r>
+              <a:rPr lang="en-US" dirty="0"/>
+              <a:t>Create a folder in the user’s </a:t>
+            </a:r>
+            <a:r>
+              <a:rPr lang="en-US" i="1" dirty="0"/>
+              <a:t>Music</a:t>
+            </a:r>
+            <a:r>
+              <a:rPr lang="en-US" dirty="0"/>
+              <a:t> directory called </a:t>
+            </a:r>
+            <a:r>
+              <a:rPr lang="en-US" b="1" dirty="0" err="1"/>
+              <a:t>to_SD</a:t>
+            </a:r>
+            <a:r>
+              <a:rPr lang="en-US" b="1" dirty="0"/>
+              <a:t>.</a:t>
+            </a:r>
+          </a:p>
+          <a:p>
+            <a:r>
+              <a:rPr lang="en-US" dirty="0"/>
+              <a:t>Copy desired .mp3/.m4a files into </a:t>
+            </a:r>
+            <a:r>
+              <a:rPr lang="en-US" b="1" dirty="0" err="1"/>
+              <a:t>to_SD</a:t>
+            </a:r>
+            <a:r>
+              <a:rPr lang="en-US" dirty="0"/>
+              <a:t>.</a:t>
+            </a:r>
+          </a:p>
+          <a:p>
+            <a:r>
+              <a:rPr lang="en-US" dirty="0"/>
+              <a:t>In the embsys105/Project directory, run the </a:t>
+            </a:r>
+            <a:r>
+              <a:rPr lang="en-US" b="1" dirty="0"/>
+              <a:t>generateSongList.py</a:t>
+            </a:r>
+            <a:r>
+              <a:rPr lang="en-US" dirty="0"/>
+              <a:t> python script.</a:t>
+            </a:r>
+          </a:p>
+          <a:p>
+            <a:pPr lvl="1"/>
+            <a:r>
+              <a:rPr lang="en-US" dirty="0"/>
+              <a:t>Renames files so they can be read within the MP3 Player application.</a:t>
+            </a:r>
+          </a:p>
+          <a:p>
+            <a:pPr lvl="1"/>
+            <a:r>
+              <a:rPr lang="en-US" dirty="0"/>
+              <a:t>Creates a file, songs.txt, that is read by the MP3 Player application to populate a linked list of track information.</a:t>
+            </a:r>
+          </a:p>
+          <a:p>
+            <a:pPr lvl="1"/>
+            <a:r>
+              <a:rPr lang="en-US" dirty="0"/>
+              <a:t>Line format within </a:t>
+            </a:r>
+            <a:r>
+              <a:rPr lang="en-US" b="1" dirty="0" err="1"/>
+              <a:t>songs.</a:t>
+            </a:r>
+            <a:r>
+              <a:rPr lang="en-US" dirty="0" err="1"/>
+              <a:t>txt</a:t>
+            </a:r>
+            <a:r>
+              <a:rPr lang="en-US" dirty="0"/>
+              <a:t> (for .mp3 files):</a:t>
+            </a:r>
+          </a:p>
+          <a:p>
+            <a:pPr lvl="2"/>
+            <a:r>
+              <a:rPr lang="en-US" dirty="0"/>
+              <a:t>“track&lt;file number&gt;.mp3, &lt;song name&gt;.mp3”</a:t>
+            </a:r>
+          </a:p>
+          <a:p>
+            <a:pPr lvl="2"/>
+            <a:r>
+              <a:rPr lang="en-US" dirty="0"/>
+              <a:t>Ex: track004.mp3, Involuntary Doppelganger.mp3</a:t>
+            </a:r>
+          </a:p>
+          <a:p>
+            <a:r>
+              <a:rPr lang="en-US" dirty="0"/>
+              <a:t>Copy the contents of the </a:t>
+            </a:r>
+            <a:r>
+              <a:rPr lang="en-US" b="1" dirty="0" err="1"/>
+              <a:t>to_SD</a:t>
+            </a:r>
+            <a:r>
+              <a:rPr lang="en-US" dirty="0"/>
+              <a:t> directory into the root directory of the SD card.</a:t>
+            </a:r>
           </a:p>
         </p:txBody>
       </p:sp>
     </p:spTree>
     <p:extLst>
       <p:ext uri="{BB962C8B-B14F-4D97-AF65-F5344CB8AC3E}">
-        <p14:creationId xmlns:p14="http://schemas.microsoft.com/office/powerpoint/2010/main" val="2321027947"/>
+        <p14:creationId xmlns:p14="http://schemas.microsoft.com/office/powerpoint/2010/main" val="1915672440"/>
       </p:ext>
     </p:extLst>
   </p:cSld>
@@ -7421,7 +7329,7 @@
           <p:cNvPr id="2" name="Title 1">
             <a:extLst>
               <a:ext uri="{FF2B5EF4-FFF2-40B4-BE49-F238E27FC236}">
-                <a16:creationId xmlns:a16="http://schemas.microsoft.com/office/drawing/2014/main" id="{D4852A90-2B00-40CD-8D60-E12CC3A01DF5}"/>
+                <a16:creationId xmlns:a16="http://schemas.microsoft.com/office/drawing/2014/main" id="{F063DFEB-1141-4B14-A7AE-D34FFE996479}"/>
               </a:ext>
             </a:extLst>
           </p:cNvPr>
@@ -7437,18 +7345,54 @@
           <a:bodyPr/>
           <a:lstStyle/>
           <a:p>
-            <a:r>
-              <a:rPr lang="en-US" dirty="0" err="1"/>
-              <a:t>TouchPollingTask</a:t>
-            </a:r>
-            <a:endParaRPr lang="en-US" dirty="0"/>
-          </a:p>
-        </p:txBody>
-      </p:sp>
+            <a:pPr algn="ctr"/>
+            <a:r>
+              <a:rPr lang="en-US" dirty="0"/>
+              <a:t>Controls Layout</a:t>
+            </a:r>
+          </a:p>
+        </p:txBody>
+      </p:sp>
+      <p:pic>
+        <p:nvPicPr>
+          <p:cNvPr id="5" name="Picture 4" descr="A screenshot of a cell phone&#10;&#10;Description automatically generated">
+            <a:extLst>
+              <a:ext uri="{FF2B5EF4-FFF2-40B4-BE49-F238E27FC236}">
+                <a16:creationId xmlns:a16="http://schemas.microsoft.com/office/drawing/2014/main" id="{E0AA0076-DB6A-4712-84D3-86A8CECDB5B9}"/>
+              </a:ext>
+            </a:extLst>
+          </p:cNvPr>
+          <p:cNvPicPr>
+            <a:picLocks noChangeAspect="1"/>
+          </p:cNvPicPr>
+          <p:nvPr/>
+        </p:nvPicPr>
+        <p:blipFill>
+          <a:blip r:embed="rId2">
+            <a:extLst>
+              <a:ext uri="{28A0092B-C50C-407E-A947-70E740481C1C}">
+                <a14:useLocalDpi xmlns:a14="http://schemas.microsoft.com/office/drawing/2010/main" val="0"/>
+              </a:ext>
+            </a:extLst>
+          </a:blip>
+          <a:stretch>
+            <a:fillRect/>
+          </a:stretch>
+        </p:blipFill>
+        <p:spPr>
+          <a:xfrm>
+            <a:off x="677334" y="1930400"/>
+            <a:ext cx="10039350" cy="3762375"/>
+          </a:xfrm>
+          <a:prstGeom prst="rect">
+            <a:avLst/>
+          </a:prstGeom>
+        </p:spPr>
+      </p:pic>
     </p:spTree>
     <p:extLst>
       <p:ext uri="{BB962C8B-B14F-4D97-AF65-F5344CB8AC3E}">
-        <p14:creationId xmlns:p14="http://schemas.microsoft.com/office/powerpoint/2010/main" val="1763416746"/>
+        <p14:creationId xmlns:p14="http://schemas.microsoft.com/office/powerpoint/2010/main" val="1239112764"/>
       </p:ext>
     </p:extLst>
   </p:cSld>
@@ -7480,7 +7424,7 @@
           <p:cNvPr id="2" name="Title 1">
             <a:extLst>
               <a:ext uri="{FF2B5EF4-FFF2-40B4-BE49-F238E27FC236}">
-                <a16:creationId xmlns:a16="http://schemas.microsoft.com/office/drawing/2014/main" id="{75EDB837-B10F-4AED-B6CA-2355EB8FDEA3}"/>
+                <a16:creationId xmlns:a16="http://schemas.microsoft.com/office/drawing/2014/main" id="{1D576542-CE1F-44DF-B072-94DAD00B841C}"/>
               </a:ext>
             </a:extLst>
           </p:cNvPr>
@@ -7493,62 +7437,477 @@
         </p:nvSpPr>
         <p:spPr>
           <a:xfrm>
-            <a:off x="4550218" y="0"/>
-            <a:ext cx="4897966" cy="1320800"/>
+            <a:off x="677334" y="609600"/>
+            <a:ext cx="4599516" cy="1320800"/>
           </a:xfrm>
         </p:spPr>
         <p:txBody>
           <a:bodyPr/>
           <a:lstStyle/>
           <a:p>
-            <a:r>
-              <a:rPr lang="en-US" dirty="0" err="1"/>
-              <a:t>CommandHandlerTask</a:t>
-            </a:r>
-            <a:endParaRPr lang="en-US" dirty="0"/>
-          </a:p>
-        </p:txBody>
-      </p:sp>
-      <p:pic>
-        <p:nvPicPr>
-          <p:cNvPr id="6" name="Picture 5" descr="A screenshot of a cell phone&#10;&#10;Description automatically generated">
+            <a:pPr algn="ctr"/>
+            <a:r>
+              <a:rPr lang="en-US" dirty="0"/>
+              <a:t>Stats</a:t>
+            </a:r>
+          </a:p>
+        </p:txBody>
+      </p:sp>
+      <p:sp>
+        <p:nvSpPr>
+          <p:cNvPr id="3" name="Content Placeholder 2">
             <a:extLst>
               <a:ext uri="{FF2B5EF4-FFF2-40B4-BE49-F238E27FC236}">
-                <a16:creationId xmlns:a16="http://schemas.microsoft.com/office/drawing/2014/main" id="{EBF9DF9C-9F60-4529-A34A-ADDB329D4BAC}"/>
+                <a16:creationId xmlns:a16="http://schemas.microsoft.com/office/drawing/2014/main" id="{BC4D42D4-E91A-4B8D-BDDB-B2C009A7DD49}"/>
               </a:ext>
             </a:extLst>
           </p:cNvPr>
-          <p:cNvPicPr>
-            <a:picLocks noChangeAspect="1"/>
-          </p:cNvPicPr>
-          <p:nvPr/>
-        </p:nvPicPr>
-        <p:blipFill>
-          <a:blip r:embed="rId2">
+          <p:cNvSpPr>
+            <a:spLocks noGrp="1"/>
+          </p:cNvSpPr>
+          <p:nvPr>
+            <p:ph idx="1"/>
+          </p:nvPr>
+        </p:nvSpPr>
+        <p:spPr>
+          <a:xfrm>
+            <a:off x="677334" y="2160589"/>
+            <a:ext cx="4599516" cy="3880773"/>
+          </a:xfrm>
+        </p:spPr>
+        <p:txBody>
+          <a:bodyPr/>
+          <a:lstStyle/>
+          <a:p>
+            <a:r>
+              <a:rPr lang="en-US" dirty="0"/>
+              <a:t>30,369 bytes of </a:t>
+            </a:r>
+            <a:r>
+              <a:rPr lang="en-US" dirty="0" err="1"/>
+              <a:t>readonly</a:t>
+            </a:r>
+            <a:r>
+              <a:rPr lang="en-US" dirty="0"/>
+              <a:t>  code memory</a:t>
+            </a:r>
+          </a:p>
+          <a:p>
+            <a:r>
+              <a:rPr lang="en-US" dirty="0"/>
+              <a:t>  3,960 bytes of </a:t>
+            </a:r>
+            <a:r>
+              <a:rPr lang="en-US" dirty="0" err="1"/>
+              <a:t>readonly</a:t>
+            </a:r>
+            <a:r>
+              <a:rPr lang="en-US" dirty="0"/>
+              <a:t>  data memory</a:t>
+            </a:r>
+          </a:p>
+          <a:p>
+            <a:r>
+              <a:rPr lang="en-US" dirty="0"/>
+              <a:t>34,198 bytes of </a:t>
+            </a:r>
+            <a:r>
+              <a:rPr lang="en-US" dirty="0" err="1"/>
+              <a:t>readwrite</a:t>
+            </a:r>
+            <a:r>
+              <a:rPr lang="en-US" dirty="0"/>
+              <a:t> data memory</a:t>
+            </a:r>
+          </a:p>
+          <a:p>
+            <a:r>
+              <a:rPr lang="en-US" dirty="0"/>
+              <a:t>Running with optimization of –O2</a:t>
+            </a:r>
+          </a:p>
+        </p:txBody>
+      </p:sp>
+      <p:sp>
+        <p:nvSpPr>
+          <p:cNvPr id="4" name="Title 1">
             <a:extLst>
-              <a:ext uri="{28A0092B-C50C-407E-A947-70E740481C1C}">
-                <a14:useLocalDpi xmlns:a14="http://schemas.microsoft.com/office/drawing/2010/main" val="0"/>
+              <a:ext uri="{FF2B5EF4-FFF2-40B4-BE49-F238E27FC236}">
+                <a16:creationId xmlns:a16="http://schemas.microsoft.com/office/drawing/2014/main" id="{28AD468A-1DEB-423D-8914-CEA7B9F48CF5}"/>
               </a:ext>
             </a:extLst>
-          </a:blip>
-          <a:stretch>
-            <a:fillRect/>
-          </a:stretch>
-        </p:blipFill>
+          </p:cNvPr>
+          <p:cNvSpPr txBox="1">
+            <a:spLocks/>
+          </p:cNvSpPr>
+          <p:nvPr/>
+        </p:nvSpPr>
         <p:spPr>
           <a:xfrm>
-            <a:off x="238568" y="292100"/>
-            <a:ext cx="10934700" cy="6087567"/>
+            <a:off x="5276850" y="609600"/>
+            <a:ext cx="4599516" cy="1320800"/>
           </a:xfrm>
           <a:prstGeom prst="rect">
             <a:avLst/>
           </a:prstGeom>
         </p:spPr>
-      </p:pic>
+        <p:txBody>
+          <a:bodyPr vert="horz" lIns="91440" tIns="45720" rIns="91440" bIns="45720" rtlCol="0" anchor="t">
+            <a:normAutofit/>
+          </a:bodyPr>
+          <a:lstStyle>
+            <a:lvl1pPr algn="l" defTabSz="457200" rtl="0" eaLnBrk="1" latinLnBrk="0" hangingPunct="1">
+              <a:spcBef>
+                <a:spcPct val="0"/>
+              </a:spcBef>
+              <a:buNone/>
+              <a:defRPr sz="3600" kern="1200">
+                <a:solidFill>
+                  <a:schemeClr val="accent1"/>
+                </a:solidFill>
+                <a:latin typeface="+mj-lt"/>
+                <a:ea typeface="+mj-ea"/>
+                <a:cs typeface="+mj-cs"/>
+              </a:defRPr>
+            </a:lvl1pPr>
+            <a:lvl2pPr eaLnBrk="1" hangingPunct="1">
+              <a:defRPr>
+                <a:solidFill>
+                  <a:schemeClr val="tx2"/>
+                </a:solidFill>
+              </a:defRPr>
+            </a:lvl2pPr>
+            <a:lvl3pPr eaLnBrk="1" hangingPunct="1">
+              <a:defRPr>
+                <a:solidFill>
+                  <a:schemeClr val="tx2"/>
+                </a:solidFill>
+              </a:defRPr>
+            </a:lvl3pPr>
+            <a:lvl4pPr eaLnBrk="1" hangingPunct="1">
+              <a:defRPr>
+                <a:solidFill>
+                  <a:schemeClr val="tx2"/>
+                </a:solidFill>
+              </a:defRPr>
+            </a:lvl4pPr>
+            <a:lvl5pPr eaLnBrk="1" hangingPunct="1">
+              <a:defRPr>
+                <a:solidFill>
+                  <a:schemeClr val="tx2"/>
+                </a:solidFill>
+              </a:defRPr>
+            </a:lvl5pPr>
+            <a:lvl6pPr eaLnBrk="1" hangingPunct="1">
+              <a:defRPr>
+                <a:solidFill>
+                  <a:schemeClr val="tx2"/>
+                </a:solidFill>
+              </a:defRPr>
+            </a:lvl6pPr>
+            <a:lvl7pPr eaLnBrk="1" hangingPunct="1">
+              <a:defRPr>
+                <a:solidFill>
+                  <a:schemeClr val="tx2"/>
+                </a:solidFill>
+              </a:defRPr>
+            </a:lvl7pPr>
+            <a:lvl8pPr eaLnBrk="1" hangingPunct="1">
+              <a:defRPr>
+                <a:solidFill>
+                  <a:schemeClr val="tx2"/>
+                </a:solidFill>
+              </a:defRPr>
+            </a:lvl8pPr>
+            <a:lvl9pPr eaLnBrk="1" hangingPunct="1">
+              <a:defRPr>
+                <a:solidFill>
+                  <a:schemeClr val="tx2"/>
+                </a:solidFill>
+              </a:defRPr>
+            </a:lvl9pPr>
+          </a:lstStyle>
+          <a:p>
+            <a:pPr algn="ctr"/>
+            <a:r>
+              <a:rPr lang="en-US" dirty="0"/>
+              <a:t>Tools Used</a:t>
+            </a:r>
+          </a:p>
+        </p:txBody>
+      </p:sp>
+      <p:sp>
+        <p:nvSpPr>
+          <p:cNvPr id="5" name="Content Placeholder 2">
+            <a:extLst>
+              <a:ext uri="{FF2B5EF4-FFF2-40B4-BE49-F238E27FC236}">
+                <a16:creationId xmlns:a16="http://schemas.microsoft.com/office/drawing/2014/main" id="{5AE71B8F-7D96-4E63-9B75-6C91D4388C35}"/>
+              </a:ext>
+            </a:extLst>
+          </p:cNvPr>
+          <p:cNvSpPr txBox="1">
+            <a:spLocks/>
+          </p:cNvSpPr>
+          <p:nvPr/>
+        </p:nvSpPr>
+        <p:spPr>
+          <a:xfrm>
+            <a:off x="5276850" y="2160589"/>
+            <a:ext cx="4599516" cy="3880773"/>
+          </a:xfrm>
+          <a:prstGeom prst="rect">
+            <a:avLst/>
+          </a:prstGeom>
+        </p:spPr>
+        <p:txBody>
+          <a:bodyPr vert="horz" lIns="91440" tIns="45720" rIns="91440" bIns="45720" rtlCol="0">
+            <a:normAutofit/>
+          </a:bodyPr>
+          <a:lstStyle>
+            <a:lvl1pPr marL="342900" indent="-342900" algn="l" defTabSz="457200" rtl="0" eaLnBrk="1" latinLnBrk="0" hangingPunct="1">
+              <a:spcBef>
+                <a:spcPts val="1000"/>
+              </a:spcBef>
+              <a:spcAft>
+                <a:spcPts val="0"/>
+              </a:spcAft>
+              <a:buClr>
+                <a:schemeClr val="accent1"/>
+              </a:buClr>
+              <a:buSzPct val="80000"/>
+              <a:buFont typeface="Wingdings 3" charset="2"/>
+              <a:buChar char=""/>
+              <a:defRPr sz="1800" kern="1200">
+                <a:solidFill>
+                  <a:schemeClr val="tx1">
+                    <a:lumMod val="75000"/>
+                    <a:lumOff val="25000"/>
+                  </a:schemeClr>
+                </a:solidFill>
+                <a:latin typeface="+mn-lt"/>
+                <a:ea typeface="+mn-ea"/>
+                <a:cs typeface="+mn-cs"/>
+              </a:defRPr>
+            </a:lvl1pPr>
+            <a:lvl2pPr marL="742950" indent="-285750" algn="l" defTabSz="457200" rtl="0" eaLnBrk="1" latinLnBrk="0" hangingPunct="1">
+              <a:spcBef>
+                <a:spcPts val="1000"/>
+              </a:spcBef>
+              <a:spcAft>
+                <a:spcPts val="0"/>
+              </a:spcAft>
+              <a:buClr>
+                <a:schemeClr val="accent1"/>
+              </a:buClr>
+              <a:buSzPct val="80000"/>
+              <a:buFont typeface="Wingdings 3" charset="2"/>
+              <a:buChar char=""/>
+              <a:defRPr sz="1600" kern="1200">
+                <a:solidFill>
+                  <a:schemeClr val="tx1">
+                    <a:lumMod val="75000"/>
+                    <a:lumOff val="25000"/>
+                  </a:schemeClr>
+                </a:solidFill>
+                <a:latin typeface="+mn-lt"/>
+                <a:ea typeface="+mn-ea"/>
+                <a:cs typeface="+mn-cs"/>
+              </a:defRPr>
+            </a:lvl2pPr>
+            <a:lvl3pPr marL="1143000" indent="-228600" algn="l" defTabSz="457200" rtl="0" eaLnBrk="1" latinLnBrk="0" hangingPunct="1">
+              <a:spcBef>
+                <a:spcPts val="1000"/>
+              </a:spcBef>
+              <a:spcAft>
+                <a:spcPts val="0"/>
+              </a:spcAft>
+              <a:buClr>
+                <a:schemeClr val="accent1"/>
+              </a:buClr>
+              <a:buSzPct val="80000"/>
+              <a:buFont typeface="Wingdings 3" charset="2"/>
+              <a:buChar char=""/>
+              <a:defRPr sz="1400" kern="1200">
+                <a:solidFill>
+                  <a:schemeClr val="tx1">
+                    <a:lumMod val="75000"/>
+                    <a:lumOff val="25000"/>
+                  </a:schemeClr>
+                </a:solidFill>
+                <a:latin typeface="+mn-lt"/>
+                <a:ea typeface="+mn-ea"/>
+                <a:cs typeface="+mn-cs"/>
+              </a:defRPr>
+            </a:lvl3pPr>
+            <a:lvl4pPr marL="1600200" indent="-228600" algn="l" defTabSz="457200" rtl="0" eaLnBrk="1" latinLnBrk="0" hangingPunct="1">
+              <a:spcBef>
+                <a:spcPts val="1000"/>
+              </a:spcBef>
+              <a:spcAft>
+                <a:spcPts val="0"/>
+              </a:spcAft>
+              <a:buClr>
+                <a:schemeClr val="accent1"/>
+              </a:buClr>
+              <a:buSzPct val="80000"/>
+              <a:buFont typeface="Wingdings 3" charset="2"/>
+              <a:buChar char=""/>
+              <a:defRPr sz="1200" kern="1200">
+                <a:solidFill>
+                  <a:schemeClr val="tx1">
+                    <a:lumMod val="75000"/>
+                    <a:lumOff val="25000"/>
+                  </a:schemeClr>
+                </a:solidFill>
+                <a:latin typeface="+mn-lt"/>
+                <a:ea typeface="+mn-ea"/>
+                <a:cs typeface="+mn-cs"/>
+              </a:defRPr>
+            </a:lvl4pPr>
+            <a:lvl5pPr marL="2057400" indent="-228600" algn="l" defTabSz="457200" rtl="0" eaLnBrk="1" latinLnBrk="0" hangingPunct="1">
+              <a:spcBef>
+                <a:spcPts val="1000"/>
+              </a:spcBef>
+              <a:spcAft>
+                <a:spcPts val="0"/>
+              </a:spcAft>
+              <a:buClr>
+                <a:schemeClr val="accent1"/>
+              </a:buClr>
+              <a:buSzPct val="80000"/>
+              <a:buFont typeface="Wingdings 3" charset="2"/>
+              <a:buChar char=""/>
+              <a:defRPr sz="1200" kern="1200">
+                <a:solidFill>
+                  <a:schemeClr val="tx1">
+                    <a:lumMod val="75000"/>
+                    <a:lumOff val="25000"/>
+                  </a:schemeClr>
+                </a:solidFill>
+                <a:latin typeface="+mn-lt"/>
+                <a:ea typeface="+mn-ea"/>
+                <a:cs typeface="+mn-cs"/>
+              </a:defRPr>
+            </a:lvl5pPr>
+            <a:lvl6pPr marL="2514600" indent="-228600" algn="l" defTabSz="457200" rtl="0" eaLnBrk="1" latinLnBrk="0" hangingPunct="1">
+              <a:spcBef>
+                <a:spcPts val="1000"/>
+              </a:spcBef>
+              <a:spcAft>
+                <a:spcPts val="0"/>
+              </a:spcAft>
+              <a:buClr>
+                <a:schemeClr val="accent1"/>
+              </a:buClr>
+              <a:buSzPct val="80000"/>
+              <a:buFont typeface="Wingdings 3" charset="2"/>
+              <a:buChar char=""/>
+              <a:defRPr sz="1200" kern="1200">
+                <a:solidFill>
+                  <a:schemeClr val="tx1">
+                    <a:lumMod val="75000"/>
+                    <a:lumOff val="25000"/>
+                  </a:schemeClr>
+                </a:solidFill>
+                <a:latin typeface="+mn-lt"/>
+                <a:ea typeface="+mn-ea"/>
+                <a:cs typeface="+mn-cs"/>
+              </a:defRPr>
+            </a:lvl6pPr>
+            <a:lvl7pPr marL="2971800" indent="-228600" algn="l" defTabSz="457200" rtl="0" eaLnBrk="1" latinLnBrk="0" hangingPunct="1">
+              <a:spcBef>
+                <a:spcPts val="1000"/>
+              </a:spcBef>
+              <a:spcAft>
+                <a:spcPts val="0"/>
+              </a:spcAft>
+              <a:buClr>
+                <a:schemeClr val="accent1"/>
+              </a:buClr>
+              <a:buSzPct val="80000"/>
+              <a:buFont typeface="Wingdings 3" charset="2"/>
+              <a:buChar char=""/>
+              <a:defRPr sz="1200" kern="1200">
+                <a:solidFill>
+                  <a:schemeClr val="tx1">
+                    <a:lumMod val="75000"/>
+                    <a:lumOff val="25000"/>
+                  </a:schemeClr>
+                </a:solidFill>
+                <a:latin typeface="+mn-lt"/>
+                <a:ea typeface="+mn-ea"/>
+                <a:cs typeface="+mn-cs"/>
+              </a:defRPr>
+            </a:lvl7pPr>
+            <a:lvl8pPr marL="3429000" indent="-228600" algn="l" defTabSz="457200" rtl="0" eaLnBrk="1" latinLnBrk="0" hangingPunct="1">
+              <a:spcBef>
+                <a:spcPts val="1000"/>
+              </a:spcBef>
+              <a:spcAft>
+                <a:spcPts val="0"/>
+              </a:spcAft>
+              <a:buClr>
+                <a:schemeClr val="accent1"/>
+              </a:buClr>
+              <a:buSzPct val="80000"/>
+              <a:buFont typeface="Wingdings 3" charset="2"/>
+              <a:buChar char=""/>
+              <a:defRPr sz="1200" kern="1200">
+                <a:solidFill>
+                  <a:schemeClr val="tx1">
+                    <a:lumMod val="75000"/>
+                    <a:lumOff val="25000"/>
+                  </a:schemeClr>
+                </a:solidFill>
+                <a:latin typeface="+mn-lt"/>
+                <a:ea typeface="+mn-ea"/>
+                <a:cs typeface="+mn-cs"/>
+              </a:defRPr>
+            </a:lvl8pPr>
+            <a:lvl9pPr marL="3886200" indent="-228600" algn="l" defTabSz="457200" rtl="0" eaLnBrk="1" latinLnBrk="0" hangingPunct="1">
+              <a:spcBef>
+                <a:spcPts val="1000"/>
+              </a:spcBef>
+              <a:spcAft>
+                <a:spcPts val="0"/>
+              </a:spcAft>
+              <a:buClr>
+                <a:schemeClr val="accent1"/>
+              </a:buClr>
+              <a:buSzPct val="80000"/>
+              <a:buFont typeface="Wingdings 3" charset="2"/>
+              <a:buChar char=""/>
+              <a:defRPr sz="1200" kern="1200">
+                <a:solidFill>
+                  <a:schemeClr val="tx1">
+                    <a:lumMod val="75000"/>
+                    <a:lumOff val="25000"/>
+                  </a:schemeClr>
+                </a:solidFill>
+                <a:latin typeface="+mn-lt"/>
+                <a:ea typeface="+mn-ea"/>
+                <a:cs typeface="+mn-cs"/>
+              </a:defRPr>
+            </a:lvl9pPr>
+          </a:lstStyle>
+          <a:p>
+            <a:r>
+              <a:rPr lang="en-US" dirty="0"/>
+              <a:t>Python 3.7 (generating song list)</a:t>
+            </a:r>
+          </a:p>
+          <a:p>
+            <a:r>
+              <a:rPr lang="en-US" dirty="0"/>
+              <a:t>Draw.io (now diagrams.net) for flow charts</a:t>
+            </a:r>
+          </a:p>
+        </p:txBody>
+      </p:sp>
     </p:spTree>
     <p:extLst>
       <p:ext uri="{BB962C8B-B14F-4D97-AF65-F5344CB8AC3E}">
-        <p14:creationId xmlns:p14="http://schemas.microsoft.com/office/powerpoint/2010/main" val="3807682051"/>
+        <p14:creationId xmlns:p14="http://schemas.microsoft.com/office/powerpoint/2010/main" val="3771012472"/>
       </p:ext>
     </p:extLst>
   </p:cSld>

</xml_diff>

<commit_message>
Added documentation for MP3 Player Project
</commit_message>
<xml_diff>
--- a/Project/Presentation.pptx
+++ b/Project/Presentation.pptx
@@ -848,7 +848,7 @@
           <a:p>
             <a:fld id="{D8DCDA63-C378-4D8D-91ED-C6497C5896B9}" type="datetimeFigureOut">
               <a:rPr lang="en-US" smtClean="0"/>
-              <a:t>3/14/2020</a:t>
+              <a:t>3/15/20</a:t>
             </a:fld>
             <a:endParaRPr lang="en-US"/>
           </a:p>
@@ -1099,7 +1099,7 @@
           <a:p>
             <a:fld id="{D8DCDA63-C378-4D8D-91ED-C6497C5896B9}" type="datetimeFigureOut">
               <a:rPr lang="en-US" smtClean="0"/>
-              <a:t>3/14/2020</a:t>
+              <a:t>3/15/20</a:t>
             </a:fld>
             <a:endParaRPr lang="en-US"/>
           </a:p>
@@ -1413,7 +1413,7 @@
           <a:p>
             <a:fld id="{D8DCDA63-C378-4D8D-91ED-C6497C5896B9}" type="datetimeFigureOut">
               <a:rPr lang="en-US" smtClean="0"/>
-              <a:t>3/14/2020</a:t>
+              <a:t>3/15/20</a:t>
             </a:fld>
             <a:endParaRPr lang="en-US"/>
           </a:p>
@@ -1754,7 +1754,7 @@
           <a:p>
             <a:fld id="{D8DCDA63-C378-4D8D-91ED-C6497C5896B9}" type="datetimeFigureOut">
               <a:rPr lang="en-US" smtClean="0"/>
-              <a:t>3/14/2020</a:t>
+              <a:t>3/15/20</a:t>
             </a:fld>
             <a:endParaRPr lang="en-US"/>
           </a:p>
@@ -2068,7 +2068,7 @@
           <a:p>
             <a:fld id="{D8DCDA63-C378-4D8D-91ED-C6497C5896B9}" type="datetimeFigureOut">
               <a:rPr lang="en-US" smtClean="0"/>
-              <a:t>3/14/2020</a:t>
+              <a:t>3/15/20</a:t>
             </a:fld>
             <a:endParaRPr lang="en-US"/>
           </a:p>
@@ -2461,7 +2461,7 @@
           <a:p>
             <a:fld id="{D8DCDA63-C378-4D8D-91ED-C6497C5896B9}" type="datetimeFigureOut">
               <a:rPr lang="en-US" smtClean="0"/>
-              <a:t>3/14/2020</a:t>
+              <a:t>3/15/20</a:t>
             </a:fld>
             <a:endParaRPr lang="en-US"/>
           </a:p>
@@ -2631,7 +2631,7 @@
           <a:p>
             <a:fld id="{D8DCDA63-C378-4D8D-91ED-C6497C5896B9}" type="datetimeFigureOut">
               <a:rPr lang="en-US" smtClean="0"/>
-              <a:t>3/14/2020</a:t>
+              <a:t>3/15/20</a:t>
             </a:fld>
             <a:endParaRPr lang="en-US"/>
           </a:p>
@@ -2811,7 +2811,7 @@
           <a:p>
             <a:fld id="{D8DCDA63-C378-4D8D-91ED-C6497C5896B9}" type="datetimeFigureOut">
               <a:rPr lang="en-US" smtClean="0"/>
-              <a:t>3/14/2020</a:t>
+              <a:t>3/15/20</a:t>
             </a:fld>
             <a:endParaRPr lang="en-US"/>
           </a:p>
@@ -2987,7 +2987,7 @@
           <a:p>
             <a:fld id="{D8DCDA63-C378-4D8D-91ED-C6497C5896B9}" type="datetimeFigureOut">
               <a:rPr lang="en-US" smtClean="0"/>
-              <a:t>3/14/2020</a:t>
+              <a:t>3/15/20</a:t>
             </a:fld>
             <a:endParaRPr lang="en-US"/>
           </a:p>
@@ -3234,7 +3234,7 @@
           <a:p>
             <a:fld id="{D8DCDA63-C378-4D8D-91ED-C6497C5896B9}" type="datetimeFigureOut">
               <a:rPr lang="en-US" smtClean="0"/>
-              <a:t>3/14/2020</a:t>
+              <a:t>3/15/20</a:t>
             </a:fld>
             <a:endParaRPr lang="en-US"/>
           </a:p>
@@ -3466,7 +3466,7 @@
           <a:p>
             <a:fld id="{D8DCDA63-C378-4D8D-91ED-C6497C5896B9}" type="datetimeFigureOut">
               <a:rPr lang="en-US" smtClean="0"/>
-              <a:t>3/14/2020</a:t>
+              <a:t>3/15/20</a:t>
             </a:fld>
             <a:endParaRPr lang="en-US"/>
           </a:p>
@@ -3840,7 +3840,7 @@
           <a:p>
             <a:fld id="{D8DCDA63-C378-4D8D-91ED-C6497C5896B9}" type="datetimeFigureOut">
               <a:rPr lang="en-US" smtClean="0"/>
-              <a:t>3/14/2020</a:t>
+              <a:t>3/15/20</a:t>
             </a:fld>
             <a:endParaRPr lang="en-US"/>
           </a:p>
@@ -3963,7 +3963,7 @@
           <a:p>
             <a:fld id="{D8DCDA63-C378-4D8D-91ED-C6497C5896B9}" type="datetimeFigureOut">
               <a:rPr lang="en-US" smtClean="0"/>
-              <a:t>3/14/2020</a:t>
+              <a:t>3/15/20</a:t>
             </a:fld>
             <a:endParaRPr lang="en-US"/>
           </a:p>
@@ -4058,7 +4058,7 @@
           <a:p>
             <a:fld id="{D8DCDA63-C378-4D8D-91ED-C6497C5896B9}" type="datetimeFigureOut">
               <a:rPr lang="en-US" smtClean="0"/>
-              <a:t>3/14/2020</a:t>
+              <a:t>3/15/20</a:t>
             </a:fld>
             <a:endParaRPr lang="en-US"/>
           </a:p>
@@ -4313,7 +4313,7 @@
           <a:p>
             <a:fld id="{D8DCDA63-C378-4D8D-91ED-C6497C5896B9}" type="datetimeFigureOut">
               <a:rPr lang="en-US" smtClean="0"/>
-              <a:t>3/14/2020</a:t>
+              <a:t>3/15/20</a:t>
             </a:fld>
             <a:endParaRPr lang="en-US"/>
           </a:p>
@@ -4576,7 +4576,7 @@
           <a:p>
             <a:fld id="{D8DCDA63-C378-4D8D-91ED-C6497C5896B9}" type="datetimeFigureOut">
               <a:rPr lang="en-US" smtClean="0"/>
-              <a:t>3/14/2020</a:t>
+              <a:t>3/15/20</a:t>
             </a:fld>
             <a:endParaRPr lang="en-US"/>
           </a:p>
@@ -5319,7 +5319,7 @@
           <a:p>
             <a:fld id="{D8DCDA63-C378-4D8D-91ED-C6497C5896B9}" type="datetimeFigureOut">
               <a:rPr lang="en-US" smtClean="0"/>
-              <a:t>3/14/2020</a:t>
+              <a:t>3/15/20</a:t>
             </a:fld>
             <a:endParaRPr lang="en-US"/>
           </a:p>

</xml_diff>